<commit_message>
updating lecture 19 code and lecture 18 slides
</commit_message>
<xml_diff>
--- a/lecture/slides/ECE_383_Lec18.pptx
+++ b/lecture/slides/ECE_383_Lec18.pptx
@@ -21792,8 +21792,12 @@
               <a:t>Make External</a:t>
             </a:r>
             <a:r>
+              <a:rPr lang="en-US" b="0" dirty="0"/>
+              <a:t> </a:t>
+            </a:r>
+            <a:r>
               <a:rPr lang="en-US" b="0" dirty="0" smtClean="0"/>
-              <a:t>.</a:t>
+              <a:t>and then run Connection Automation</a:t>
             </a:r>
             <a:r>
               <a:rPr lang="en-US" dirty="0"/>
@@ -22955,7 +22959,7 @@
             </a:r>
             <a:r>
               <a:rPr lang="en-US" b="0" dirty="0" smtClean="0"/>
-              <a:t> to modify </a:t>
+              <a:t> if you want to modify!  Otherwise skip to validate design.</a:t>
             </a:r>
             <a:endParaRPr lang="en-US" b="0" dirty="0"/>
           </a:p>
@@ -24558,37 +24562,6 @@
       </p:sp>
       <p:sp>
         <p:nvSpPr>
-          <p:cNvPr id="26" name="TextBox 25"/>
-          <p:cNvSpPr txBox="1"/>
-          <p:nvPr/>
-        </p:nvSpPr>
-        <p:spPr>
-          <a:xfrm>
-            <a:off x="531371" y="3242037"/>
-            <a:ext cx="1524000" cy="369332"/>
-          </a:xfrm>
-          <a:prstGeom prst="rect">
-            <a:avLst/>
-          </a:prstGeom>
-          <a:noFill/>
-        </p:spPr>
-        <p:txBody>
-          <a:bodyPr wrap="square" lIns="91440" tIns="45720" rIns="91440" bIns="45720" rtlCol="0">
-            <a:spAutoFit/>
-          </a:bodyPr>
-          <a:lstStyle/>
-          <a:p>
-            <a:pPr algn="ctr"/>
-            <a:r>
-              <a:rPr lang="en-US" sz="1800" b="1" dirty="0" smtClean="0"/>
-              <a:t>Lec19.c</a:t>
-            </a:r>
-            <a:endParaRPr lang="en-US" sz="4400" b="1" dirty="0"/>
-          </a:p>
-        </p:txBody>
-      </p:sp>
-      <p:sp>
-        <p:nvSpPr>
           <p:cNvPr id="27" name="Rounded Rectangle 26"/>
           <p:cNvSpPr/>
           <p:nvPr/>
@@ -24664,37 +24637,6 @@
             <a:r>
               <a:rPr lang="en-US" sz="1800" b="1" dirty="0"/>
               <a:t>@ 0x44a00000</a:t>
-            </a:r>
-            <a:endParaRPr lang="en-US" sz="4400" b="1" dirty="0"/>
-          </a:p>
-        </p:txBody>
-      </p:sp>
-      <p:sp>
-        <p:nvSpPr>
-          <p:cNvPr id="31" name="TextBox 30"/>
-          <p:cNvSpPr txBox="1"/>
-          <p:nvPr/>
-        </p:nvSpPr>
-        <p:spPr>
-          <a:xfrm>
-            <a:off x="2727689" y="3239689"/>
-            <a:ext cx="900829" cy="369332"/>
-          </a:xfrm>
-          <a:prstGeom prst="rect">
-            <a:avLst/>
-          </a:prstGeom>
-          <a:noFill/>
-        </p:spPr>
-        <p:txBody>
-          <a:bodyPr wrap="square" lIns="91440" tIns="45720" rIns="91440" bIns="45720" rtlCol="0">
-            <a:spAutoFit/>
-          </a:bodyPr>
-          <a:lstStyle/>
-          <a:p>
-            <a:pPr algn="ctr"/>
-            <a:r>
-              <a:rPr lang="en-US" sz="1800" b="1" dirty="0" err="1" smtClean="0"/>
-              <a:t>axi_lite</a:t>
             </a:r>
             <a:endParaRPr lang="en-US" sz="4400" b="1" dirty="0"/>
           </a:p>
@@ -25889,42 +25831,6 @@
       </p:cxnSp>
       <p:cxnSp>
         <p:nvCxnSpPr>
-          <p:cNvPr id="106" name="Straight Connector 105"/>
-          <p:cNvCxnSpPr/>
-          <p:nvPr/>
-        </p:nvCxnSpPr>
-        <p:spPr>
-          <a:xfrm flipV="1">
-            <a:off x="2217615" y="4505517"/>
-            <a:ext cx="506137" cy="1"/>
-          </a:xfrm>
-          <a:prstGeom prst="line">
-            <a:avLst/>
-          </a:prstGeom>
-          <a:ln w="50800">
-            <a:solidFill>
-              <a:schemeClr val="tx1"/>
-            </a:solidFill>
-            <a:tailEnd type="none"/>
-          </a:ln>
-        </p:spPr>
-        <p:style>
-          <a:lnRef idx="1">
-            <a:schemeClr val="accent1"/>
-          </a:lnRef>
-          <a:fillRef idx="0">
-            <a:schemeClr val="accent1"/>
-          </a:fillRef>
-          <a:effectRef idx="0">
-            <a:schemeClr val="accent1"/>
-          </a:effectRef>
-          <a:fontRef idx="minor">
-            <a:schemeClr val="tx1"/>
-          </a:fontRef>
-        </p:style>
-      </p:cxnSp>
-      <p:cxnSp>
-        <p:nvCxnSpPr>
           <p:cNvPr id="110" name="Straight Connector 109"/>
           <p:cNvCxnSpPr/>
           <p:nvPr/>
@@ -26471,6 +26377,135 @@
           </a:p>
         </p:txBody>
       </p:sp>
+      <p:sp>
+        <p:nvSpPr>
+          <p:cNvPr id="78" name="TextBox 77"/>
+          <p:cNvSpPr txBox="1"/>
+          <p:nvPr/>
+        </p:nvSpPr>
+        <p:spPr>
+          <a:xfrm>
+            <a:off x="4325023" y="5058118"/>
+            <a:ext cx="1446034" cy="338554"/>
+          </a:xfrm>
+          <a:prstGeom prst="rect">
+            <a:avLst/>
+          </a:prstGeom>
+          <a:noFill/>
+        </p:spPr>
+        <p:txBody>
+          <a:bodyPr wrap="square" lIns="91440" tIns="45720" rIns="91440" bIns="45720" rtlCol="0">
+            <a:spAutoFit/>
+          </a:bodyPr>
+          <a:lstStyle/>
+          <a:p>
+            <a:pPr algn="r"/>
+            <a:r>
+              <a:rPr lang="en-US" sz="1600" dirty="0" smtClean="0"/>
+              <a:t>slv_reg2</a:t>
+            </a:r>
+            <a:endParaRPr lang="en-US" sz="2000" dirty="0"/>
+          </a:p>
+        </p:txBody>
+      </p:sp>
+      <p:sp>
+        <p:nvSpPr>
+          <p:cNvPr id="26" name="TextBox 25"/>
+          <p:cNvSpPr txBox="1"/>
+          <p:nvPr/>
+        </p:nvSpPr>
+        <p:spPr>
+          <a:xfrm>
+            <a:off x="531371" y="3242037"/>
+            <a:ext cx="1524000" cy="369332"/>
+          </a:xfrm>
+          <a:prstGeom prst="rect">
+            <a:avLst/>
+          </a:prstGeom>
+          <a:noFill/>
+        </p:spPr>
+        <p:txBody>
+          <a:bodyPr wrap="square" lIns="91440" tIns="45720" rIns="91440" bIns="45720" rtlCol="0">
+            <a:spAutoFit/>
+          </a:bodyPr>
+          <a:lstStyle/>
+          <a:p>
+            <a:pPr algn="ctr"/>
+            <a:r>
+              <a:rPr lang="en-US" sz="1800" b="1" dirty="0" smtClean="0"/>
+              <a:t>Lec19.c</a:t>
+            </a:r>
+            <a:endParaRPr lang="en-US" sz="4400" b="1" dirty="0"/>
+          </a:p>
+        </p:txBody>
+      </p:sp>
+      <p:sp>
+        <p:nvSpPr>
+          <p:cNvPr id="31" name="TextBox 30"/>
+          <p:cNvSpPr txBox="1"/>
+          <p:nvPr/>
+        </p:nvSpPr>
+        <p:spPr>
+          <a:xfrm>
+            <a:off x="2727689" y="3239689"/>
+            <a:ext cx="900829" cy="369332"/>
+          </a:xfrm>
+          <a:prstGeom prst="rect">
+            <a:avLst/>
+          </a:prstGeom>
+          <a:noFill/>
+        </p:spPr>
+        <p:txBody>
+          <a:bodyPr wrap="square" lIns="91440" tIns="45720" rIns="91440" bIns="45720" rtlCol="0">
+            <a:spAutoFit/>
+          </a:bodyPr>
+          <a:lstStyle/>
+          <a:p>
+            <a:pPr algn="ctr"/>
+            <a:r>
+              <a:rPr lang="en-US" sz="1800" b="1" dirty="0" err="1" smtClean="0"/>
+              <a:t>axi_lite</a:t>
+            </a:r>
+            <a:endParaRPr lang="en-US" sz="4400" b="1" dirty="0"/>
+          </a:p>
+        </p:txBody>
+      </p:sp>
+      <p:cxnSp>
+        <p:nvCxnSpPr>
+          <p:cNvPr id="106" name="Straight Connector 105"/>
+          <p:cNvCxnSpPr/>
+          <p:nvPr/>
+        </p:nvCxnSpPr>
+        <p:spPr>
+          <a:xfrm flipV="1">
+            <a:off x="2217615" y="4505517"/>
+            <a:ext cx="506137" cy="1"/>
+          </a:xfrm>
+          <a:prstGeom prst="line">
+            <a:avLst/>
+          </a:prstGeom>
+          <a:ln w="50800">
+            <a:solidFill>
+              <a:schemeClr val="tx1"/>
+            </a:solidFill>
+            <a:tailEnd type="none"/>
+          </a:ln>
+        </p:spPr>
+        <p:style>
+          <a:lnRef idx="1">
+            <a:schemeClr val="accent1"/>
+          </a:lnRef>
+          <a:fillRef idx="0">
+            <a:schemeClr val="accent1"/>
+          </a:fillRef>
+          <a:effectRef idx="0">
+            <a:schemeClr val="accent1"/>
+          </a:effectRef>
+          <a:fontRef idx="minor">
+            <a:schemeClr val="tx1"/>
+          </a:fontRef>
+        </p:style>
+      </p:cxnSp>
     </p:spTree>
     <p:extLst>
       <p:ext uri="{BB962C8B-B14F-4D97-AF65-F5344CB8AC3E}">
@@ -26660,6 +26695,51 @@
                       </p:childTnLst>
                     </p:cTn>
                   </p:par>
+                  <p:par>
+                    <p:cTn id="17" fill="hold">
+                      <p:stCondLst>
+                        <p:cond delay="indefinite"/>
+                      </p:stCondLst>
+                      <p:childTnLst>
+                        <p:par>
+                          <p:cTn id="18" fill="hold">
+                            <p:stCondLst>
+                              <p:cond delay="0"/>
+                            </p:stCondLst>
+                            <p:childTnLst>
+                              <p:par>
+                                <p:cTn id="19" presetID="1" presetClass="entr" presetSubtype="0" fill="hold" grpId="0" nodeType="clickEffect">
+                                  <p:stCondLst>
+                                    <p:cond delay="0"/>
+                                  </p:stCondLst>
+                                  <p:childTnLst>
+                                    <p:set>
+                                      <p:cBhvr>
+                                        <p:cTn id="20" dur="1" fill="hold">
+                                          <p:stCondLst>
+                                            <p:cond delay="0"/>
+                                          </p:stCondLst>
+                                        </p:cTn>
+                                        <p:tgtEl>
+                                          <p:spTgt spid="78"/>
+                                        </p:tgtEl>
+                                        <p:attrNameLst>
+                                          <p:attrName>style.visibility</p:attrName>
+                                        </p:attrNameLst>
+                                      </p:cBhvr>
+                                      <p:to>
+                                        <p:strVal val="visible"/>
+                                      </p:to>
+                                    </p:set>
+                                  </p:childTnLst>
+                                </p:cTn>
+                              </p:par>
+                            </p:childTnLst>
+                          </p:cTn>
+                        </p:par>
+                      </p:childTnLst>
+                    </p:cTn>
+                  </p:par>
                 </p:childTnLst>
               </p:cTn>
               <p:prevCondLst>
@@ -26685,6 +26765,7 @@
       <p:bldP spid="66" grpId="0"/>
       <p:bldP spid="71" grpId="0"/>
       <p:bldP spid="72" grpId="0"/>
+      <p:bldP spid="78" grpId="0"/>
     </p:bldLst>
   </p:timing>
 </p:sld>
@@ -27276,7 +27357,7 @@
           <a:p>
             <a:r>
               <a:rPr lang="en-US" dirty="0" smtClean="0"/>
-              <a:t>Export Design</a:t>
+              <a:t>Validate and Export Design</a:t>
             </a:r>
             <a:endParaRPr lang="en-US" dirty="0"/>
           </a:p>
@@ -27302,9 +27383,51 @@
           <a:bodyPr/>
           <a:lstStyle/>
           <a:p>
+            <a:pPr marL="457200" indent="-457200">
+              <a:buFont typeface="+mj-lt"/>
+              <a:buAutoNum type="arabicPeriod"/>
+            </a:pPr>
             <a:r>
               <a:rPr lang="en-US" b="0" dirty="0" smtClean="0"/>
-              <a:t>Generate Design and take a coffee break while it builds</a:t>
+              <a:t>First click validate design_1</a:t>
+            </a:r>
+          </a:p>
+          <a:p>
+            <a:pPr marL="457200" indent="-457200">
+              <a:buFont typeface="+mj-lt"/>
+              <a:buAutoNum type="arabicPeriod"/>
+            </a:pPr>
+            <a:r>
+              <a:rPr lang="en-US" b="0" dirty="0" smtClean="0"/>
+              <a:t>Regenerate the design_1 HDL wrapper. </a:t>
+            </a:r>
+          </a:p>
+          <a:p>
+            <a:pPr marL="457200" indent="-457200">
+              <a:buFont typeface="+mj-lt"/>
+              <a:buAutoNum type="arabicPeriod"/>
+            </a:pPr>
+            <a:r>
+              <a:rPr lang="en-US" b="0" dirty="0" smtClean="0"/>
+              <a:t>Finally you need to generate the Generate Design </a:t>
+            </a:r>
+            <a:r>
+              <a:rPr lang="en-US" b="0" dirty="0" err="1" smtClean="0"/>
+              <a:t>bitstream</a:t>
+            </a:r>
+            <a:r>
+              <a:rPr lang="en-US" b="0" dirty="0" smtClean="0"/>
+              <a:t> </a:t>
+            </a:r>
+          </a:p>
+          <a:p>
+            <a:pPr marL="457200" indent="-457200">
+              <a:buFont typeface="+mj-lt"/>
+              <a:buAutoNum type="arabicPeriod"/>
+            </a:pPr>
+            <a:r>
+              <a:rPr lang="en-US" b="0" dirty="0" smtClean="0"/>
+              <a:t>Take a coffee break while it builds</a:t>
             </a:r>
             <a:endParaRPr lang="en-US" b="0" dirty="0"/>
           </a:p>

</xml_diff>

<commit_message>
Updating Lecture 18 Slides one last time with a few tweaks to the instructions.
</commit_message>
<xml_diff>
--- a/lecture/slides/ECE_383_Lec18.pptx
+++ b/lecture/slides/ECE_383_Lec18.pptx
@@ -6,10 +6,10 @@
     <p:sldMasterId id="2147483687" r:id="rId2"/>
   </p:sldMasterIdLst>
   <p:notesMasterIdLst>
-    <p:notesMasterId r:id="rId72"/>
+    <p:notesMasterId r:id="rId73"/>
   </p:notesMasterIdLst>
   <p:handoutMasterIdLst>
-    <p:handoutMasterId r:id="rId73"/>
+    <p:handoutMasterId r:id="rId74"/>
   </p:handoutMasterIdLst>
   <p:sldIdLst>
     <p:sldId id="433" r:id="rId3"/>
@@ -62,25 +62,26 @@
     <p:sldId id="483" r:id="rId50"/>
     <p:sldId id="484" r:id="rId51"/>
     <p:sldId id="482" r:id="rId52"/>
-    <p:sldId id="391" r:id="rId53"/>
-    <p:sldId id="414" r:id="rId54"/>
-    <p:sldId id="392" r:id="rId55"/>
-    <p:sldId id="393" r:id="rId56"/>
-    <p:sldId id="394" r:id="rId57"/>
-    <p:sldId id="395" r:id="rId58"/>
-    <p:sldId id="396" r:id="rId59"/>
-    <p:sldId id="422" r:id="rId60"/>
-    <p:sldId id="423" r:id="rId61"/>
-    <p:sldId id="478" r:id="rId62"/>
-    <p:sldId id="479" r:id="rId63"/>
-    <p:sldId id="481" r:id="rId64"/>
-    <p:sldId id="480" r:id="rId65"/>
-    <p:sldId id="416" r:id="rId66"/>
-    <p:sldId id="397" r:id="rId67"/>
-    <p:sldId id="418" r:id="rId68"/>
-    <p:sldId id="417" r:id="rId69"/>
-    <p:sldId id="400" r:id="rId70"/>
-    <p:sldId id="412" r:id="rId71"/>
+    <p:sldId id="486" r:id="rId53"/>
+    <p:sldId id="391" r:id="rId54"/>
+    <p:sldId id="414" r:id="rId55"/>
+    <p:sldId id="392" r:id="rId56"/>
+    <p:sldId id="393" r:id="rId57"/>
+    <p:sldId id="394" r:id="rId58"/>
+    <p:sldId id="395" r:id="rId59"/>
+    <p:sldId id="396" r:id="rId60"/>
+    <p:sldId id="422" r:id="rId61"/>
+    <p:sldId id="423" r:id="rId62"/>
+    <p:sldId id="478" r:id="rId63"/>
+    <p:sldId id="479" r:id="rId64"/>
+    <p:sldId id="481" r:id="rId65"/>
+    <p:sldId id="480" r:id="rId66"/>
+    <p:sldId id="416" r:id="rId67"/>
+    <p:sldId id="397" r:id="rId68"/>
+    <p:sldId id="418" r:id="rId69"/>
+    <p:sldId id="417" r:id="rId70"/>
+    <p:sldId id="400" r:id="rId71"/>
+    <p:sldId id="412" r:id="rId72"/>
   </p:sldIdLst>
   <p:sldSz cx="9144000" cy="6858000" type="screen4x3"/>
   <p:notesSz cx="6985000" cy="9283700"/>
@@ -1109,7 +1110,7 @@
                 </a:solidFill>
               </a:rPr>
               <a:pPr/>
-              <a:t>2/22/2017</a:t>
+              <a:t>2/23/2017</a:t>
             </a:fld>
             <a:endParaRPr lang="en-US">
               <a:solidFill>
@@ -1311,7 +1312,7 @@
                 </a:solidFill>
               </a:rPr>
               <a:pPr/>
-              <a:t>2/22/2017</a:t>
+              <a:t>2/23/2017</a:t>
             </a:fld>
             <a:endParaRPr lang="en-US">
               <a:solidFill>
@@ -1523,7 +1524,7 @@
                 </a:solidFill>
               </a:rPr>
               <a:pPr/>
-              <a:t>2/22/2017</a:t>
+              <a:t>2/23/2017</a:t>
             </a:fld>
             <a:endParaRPr lang="en-US">
               <a:solidFill>
@@ -2028,7 +2029,7 @@
                 </a:spcAft>
                 <a:defRPr/>
               </a:pPr>
-              <a:t>22 February 2017</a:t>
+              <a:t>23 February 2017</a:t>
             </a:fld>
             <a:endParaRPr lang="en-US" sz="1800">
               <a:solidFill>
@@ -2293,7 +2294,7 @@
                 </a:spcAft>
                 <a:defRPr/>
               </a:pPr>
-              <a:t>22 February 2017</a:t>
+              <a:t>23 February 2017</a:t>
             </a:fld>
             <a:endParaRPr lang="en-US" sz="1800">
               <a:solidFill>
@@ -2647,7 +2648,7 @@
                 </a:spcAft>
                 <a:defRPr/>
               </a:pPr>
-              <a:t>22 February 2017</a:t>
+              <a:t>23 February 2017</a:t>
             </a:fld>
             <a:endParaRPr lang="en-US" sz="1800">
               <a:solidFill>
@@ -3140,7 +3141,7 @@
                 </a:spcAft>
                 <a:defRPr/>
               </a:pPr>
-              <a:t>22 February 2017</a:t>
+              <a:t>23 February 2017</a:t>
             </a:fld>
             <a:endParaRPr lang="en-US" sz="1800">
               <a:solidFill>
@@ -3324,7 +3325,7 @@
                 </a:spcAft>
                 <a:defRPr/>
               </a:pPr>
-              <a:t>22 February 2017</a:t>
+              <a:t>23 February 2017</a:t>
             </a:fld>
             <a:endParaRPr lang="en-US" sz="1800">
               <a:solidFill>
@@ -3485,7 +3486,7 @@
                 </a:spcAft>
                 <a:defRPr/>
               </a:pPr>
-              <a:t>22 February 2017</a:t>
+              <a:t>23 February 2017</a:t>
             </a:fld>
             <a:endParaRPr lang="en-US" sz="1800">
               <a:solidFill>
@@ -3828,7 +3829,7 @@
                 </a:spcAft>
                 <a:defRPr/>
               </a:pPr>
-              <a:t>22 February 2017</a:t>
+              <a:t>23 February 2017</a:t>
             </a:fld>
             <a:endParaRPr lang="en-US" sz="1800">
               <a:solidFill>
@@ -3967,7 +3968,7 @@
                 </a:solidFill>
               </a:rPr>
               <a:pPr/>
-              <a:t>2/22/2017</a:t>
+              <a:t>2/23/2017</a:t>
             </a:fld>
             <a:endParaRPr lang="en-US">
               <a:solidFill>
@@ -4350,7 +4351,7 @@
                 </a:spcAft>
                 <a:defRPr/>
               </a:pPr>
-              <a:t>22 February 2017</a:t>
+              <a:t>23 February 2017</a:t>
             </a:fld>
             <a:endParaRPr lang="en-US" sz="1800">
               <a:solidFill>
@@ -4586,7 +4587,7 @@
                 </a:spcAft>
                 <a:defRPr/>
               </a:pPr>
-              <a:t>22 February 2017</a:t>
+              <a:t>23 February 2017</a:t>
             </a:fld>
             <a:endParaRPr lang="en-US" sz="1800">
               <a:solidFill>
@@ -4832,7 +4833,7 @@
                 </a:spcAft>
                 <a:defRPr/>
               </a:pPr>
-              <a:t>22 February 2017</a:t>
+              <a:t>23 February 2017</a:t>
             </a:fld>
             <a:endParaRPr lang="en-US" sz="1800">
               <a:solidFill>
@@ -5046,7 +5047,7 @@
                 </a:spcAft>
                 <a:defRPr/>
               </a:pPr>
-              <a:t>22 February 2017</a:t>
+              <a:t>23 February 2017</a:t>
             </a:fld>
             <a:endParaRPr lang="en-US" sz="1800">
               <a:solidFill>
@@ -5261,7 +5262,7 @@
                 </a:solidFill>
               </a:rPr>
               <a:pPr/>
-              <a:t>2/22/2017</a:t>
+              <a:t>2/23/2017</a:t>
             </a:fld>
             <a:endParaRPr lang="en-US">
               <a:solidFill>
@@ -5581,7 +5582,7 @@
                 </a:solidFill>
               </a:rPr>
               <a:pPr/>
-              <a:t>2/22/2017</a:t>
+              <a:t>2/23/2017</a:t>
             </a:fld>
             <a:endParaRPr lang="en-US">
               <a:solidFill>
@@ -6035,7 +6036,7 @@
                 </a:solidFill>
               </a:rPr>
               <a:pPr/>
-              <a:t>2/22/2017</a:t>
+              <a:t>2/23/2017</a:t>
             </a:fld>
             <a:endParaRPr lang="en-US">
               <a:solidFill>
@@ -6185,7 +6186,7 @@
                 </a:solidFill>
               </a:rPr>
               <a:pPr/>
-              <a:t>2/22/2017</a:t>
+              <a:t>2/23/2017</a:t>
             </a:fld>
             <a:endParaRPr lang="en-US">
               <a:solidFill>
@@ -6312,7 +6313,7 @@
                 </a:solidFill>
               </a:rPr>
               <a:pPr/>
-              <a:t>2/22/2017</a:t>
+              <a:t>2/23/2017</a:t>
             </a:fld>
             <a:endParaRPr lang="en-US">
               <a:solidFill>
@@ -6621,7 +6622,7 @@
                 </a:solidFill>
               </a:rPr>
               <a:pPr/>
-              <a:t>2/22/2017</a:t>
+              <a:t>2/23/2017</a:t>
             </a:fld>
             <a:endParaRPr lang="en-US">
               <a:solidFill>
@@ -6906,7 +6907,7 @@
                 </a:solidFill>
               </a:rPr>
               <a:pPr/>
-              <a:t>2/22/2017</a:t>
+              <a:t>2/23/2017</a:t>
             </a:fld>
             <a:endParaRPr lang="en-US">
               <a:solidFill>
@@ -7167,7 +7168,7 @@
                   <a:spcPts val="0"/>
                 </a:spcAft>
               </a:pPr>
-              <a:t>2/22/2017</a:t>
+              <a:t>2/23/2017</a:t>
             </a:fld>
             <a:endParaRPr lang="en-US">
               <a:solidFill>
@@ -23965,8 +23966,13 @@
             </a:r>
             <a:r>
               <a:rPr lang="en-US" dirty="0"/>
-              <a:t> + Custom IP</a:t>
-            </a:r>
+              <a:t> + Custom </a:t>
+            </a:r>
+            <a:r>
+              <a:rPr lang="en-US" dirty="0" smtClean="0"/>
+              <a:t>IP with Interrupt</a:t>
+            </a:r>
+            <a:endParaRPr lang="en-US" dirty="0"/>
           </a:p>
         </p:txBody>
       </p:sp>
@@ -23978,7 +23984,7 @@
         </p:nvSpPr>
         <p:spPr>
           <a:xfrm>
-            <a:off x="2723752" y="1796897"/>
+            <a:off x="2723752" y="1673072"/>
             <a:ext cx="4697837" cy="678761"/>
           </a:xfrm>
           <a:prstGeom prst="roundRect">
@@ -24026,7 +24032,7 @@
         </p:nvSpPr>
         <p:spPr>
           <a:xfrm>
-            <a:off x="2806995" y="1796897"/>
+            <a:off x="2806995" y="1673072"/>
             <a:ext cx="3255792" cy="369332"/>
           </a:xfrm>
           <a:prstGeom prst="rect">
@@ -24062,7 +24068,7 @@
         </p:nvCxnSpPr>
         <p:spPr>
           <a:xfrm>
-            <a:off x="3628519" y="4143847"/>
+            <a:off x="3628519" y="4020022"/>
             <a:ext cx="2167568" cy="0"/>
           </a:xfrm>
           <a:prstGeom prst="line">
@@ -24098,7 +24104,7 @@
         </p:nvSpPr>
         <p:spPr>
           <a:xfrm>
-            <a:off x="4338671" y="3832569"/>
+            <a:off x="4338671" y="3708744"/>
             <a:ext cx="1438967" cy="338554"/>
           </a:xfrm>
           <a:prstGeom prst="rect">
@@ -24130,7 +24136,7 @@
         </p:nvCxnSpPr>
         <p:spPr>
           <a:xfrm>
-            <a:off x="3587575" y="4447709"/>
+            <a:off x="3587575" y="4323884"/>
             <a:ext cx="2167567" cy="0"/>
           </a:xfrm>
           <a:prstGeom prst="line">
@@ -24166,7 +24172,7 @@
         </p:nvSpPr>
         <p:spPr>
           <a:xfrm>
-            <a:off x="3817751" y="4136431"/>
+            <a:off x="3817751" y="4012606"/>
             <a:ext cx="1957430" cy="338554"/>
           </a:xfrm>
           <a:prstGeom prst="rect">
@@ -24198,7 +24204,7 @@
         </p:nvCxnSpPr>
         <p:spPr>
           <a:xfrm flipV="1">
-            <a:off x="3628519" y="4759796"/>
+            <a:off x="3628519" y="4635971"/>
             <a:ext cx="2177093" cy="8158"/>
           </a:xfrm>
           <a:prstGeom prst="line">
@@ -24234,7 +24240,7 @@
         </p:nvSpPr>
         <p:spPr>
           <a:xfrm>
-            <a:off x="4338671" y="4448518"/>
+            <a:off x="4424396" y="4324693"/>
             <a:ext cx="1446034" cy="338554"/>
           </a:xfrm>
           <a:prstGeom prst="rect">
@@ -24265,7 +24271,7 @@
         </p:nvSpPr>
         <p:spPr>
           <a:xfrm>
-            <a:off x="5796087" y="3959181"/>
+            <a:off x="5796087" y="3835356"/>
             <a:ext cx="533400" cy="369332"/>
           </a:xfrm>
           <a:prstGeom prst="rect">
@@ -24295,7 +24301,7 @@
         </p:nvSpPr>
         <p:spPr>
           <a:xfrm>
-            <a:off x="5755142" y="4263043"/>
+            <a:off x="5755142" y="4139218"/>
             <a:ext cx="992856" cy="369332"/>
           </a:xfrm>
           <a:prstGeom prst="rect">
@@ -24329,7 +24335,7 @@
         </p:nvSpPr>
         <p:spPr>
           <a:xfrm>
-            <a:off x="5805612" y="4575130"/>
+            <a:off x="5805612" y="4451305"/>
             <a:ext cx="759542" cy="369332"/>
           </a:xfrm>
           <a:prstGeom prst="rect">
@@ -24359,8 +24365,8 @@
         </p:nvSpPr>
         <p:spPr>
           <a:xfrm>
-            <a:off x="183773" y="1594531"/>
-            <a:ext cx="8003422" cy="4755435"/>
+            <a:off x="183773" y="1470706"/>
+            <a:ext cx="8003422" cy="4891994"/>
           </a:xfrm>
           <a:prstGeom prst="roundRect">
             <a:avLst>
@@ -24407,7 +24413,7 @@
         </p:nvSpPr>
         <p:spPr>
           <a:xfrm>
-            <a:off x="178080" y="1609301"/>
+            <a:off x="178080" y="1485476"/>
             <a:ext cx="2400532" cy="400110"/>
           </a:xfrm>
           <a:prstGeom prst="rect">
@@ -24441,8 +24447,8 @@
         </p:nvSpPr>
         <p:spPr>
           <a:xfrm>
-            <a:off x="349288" y="2821246"/>
-            <a:ext cx="1868328" cy="3368542"/>
+            <a:off x="349288" y="2697421"/>
+            <a:ext cx="1868328" cy="3512878"/>
           </a:xfrm>
           <a:prstGeom prst="roundRect">
             <a:avLst>
@@ -24489,7 +24495,7 @@
         </p:nvSpPr>
         <p:spPr>
           <a:xfrm>
-            <a:off x="589405" y="2836413"/>
+            <a:off x="589405" y="2712588"/>
             <a:ext cx="1524000" cy="369332"/>
           </a:xfrm>
           <a:prstGeom prst="rect">
@@ -24520,7 +24526,7 @@
         </p:nvSpPr>
         <p:spPr>
           <a:xfrm>
-            <a:off x="533996" y="3242036"/>
+            <a:off x="533996" y="3118211"/>
             <a:ext cx="1490615" cy="1937937"/>
           </a:xfrm>
           <a:prstGeom prst="roundRect">
@@ -24568,8 +24574,8 @@
         </p:nvSpPr>
         <p:spPr>
           <a:xfrm>
-            <a:off x="2498963" y="2821246"/>
-            <a:ext cx="5132825" cy="3368542"/>
+            <a:off x="2498963" y="2697420"/>
+            <a:ext cx="5132825" cy="3512879"/>
           </a:xfrm>
           <a:prstGeom prst="roundRect">
             <a:avLst>
@@ -24616,7 +24622,7 @@
         </p:nvSpPr>
         <p:spPr>
           <a:xfrm>
-            <a:off x="2507263" y="2836413"/>
+            <a:off x="2507263" y="2712588"/>
             <a:ext cx="5478103" cy="369332"/>
           </a:xfrm>
           <a:prstGeom prst="rect">
@@ -24650,8 +24656,8 @@
         </p:nvSpPr>
         <p:spPr>
           <a:xfrm>
-            <a:off x="4014699" y="3239689"/>
-            <a:ext cx="3406891" cy="2781282"/>
+            <a:off x="4014699" y="3115864"/>
+            <a:ext cx="3406891" cy="2950098"/>
           </a:xfrm>
           <a:prstGeom prst="roundRect">
             <a:avLst>
@@ -24698,7 +24704,7 @@
         </p:nvSpPr>
         <p:spPr>
           <a:xfrm>
-            <a:off x="4018937" y="3239689"/>
+            <a:off x="4018937" y="3115864"/>
             <a:ext cx="3672046" cy="338554"/>
           </a:xfrm>
           <a:prstGeom prst="rect">
@@ -24728,8 +24734,8 @@
         </p:nvSpPr>
         <p:spPr>
           <a:xfrm>
-            <a:off x="5805612" y="3730265"/>
-            <a:ext cx="1490615" cy="1863315"/>
+            <a:off x="5805612" y="3606440"/>
+            <a:ext cx="1490615" cy="1971441"/>
           </a:xfrm>
           <a:prstGeom prst="roundRect">
             <a:avLst>
@@ -24776,7 +24782,7 @@
         </p:nvSpPr>
         <p:spPr>
           <a:xfrm>
-            <a:off x="5783570" y="3728002"/>
+            <a:off x="5783570" y="3604177"/>
             <a:ext cx="1493240" cy="369332"/>
           </a:xfrm>
           <a:prstGeom prst="rect">
@@ -24807,7 +24813,7 @@
         </p:nvSpPr>
         <p:spPr>
           <a:xfrm>
-            <a:off x="4121473" y="4731559"/>
+            <a:off x="4121473" y="4607734"/>
             <a:ext cx="570681" cy="369332"/>
           </a:xfrm>
           <a:prstGeom prst="rect">
@@ -24837,7 +24843,7 @@
         </p:nvCxnSpPr>
         <p:spPr>
           <a:xfrm flipV="1">
-            <a:off x="4471176" y="4615554"/>
+            <a:off x="4471176" y="4491729"/>
             <a:ext cx="323623" cy="304800"/>
           </a:xfrm>
           <a:prstGeom prst="line">
@@ -24874,7 +24880,7 @@
         </p:nvCxnSpPr>
         <p:spPr>
           <a:xfrm flipV="1">
-            <a:off x="3628519" y="5066944"/>
+            <a:off x="3628519" y="4943119"/>
             <a:ext cx="2174745" cy="8158"/>
           </a:xfrm>
           <a:prstGeom prst="line">
@@ -24910,7 +24916,7 @@
         </p:nvSpPr>
         <p:spPr>
           <a:xfrm>
-            <a:off x="4336323" y="4755666"/>
+            <a:off x="4422048" y="4631841"/>
             <a:ext cx="1446034" cy="338554"/>
           </a:xfrm>
           <a:prstGeom prst="rect">
@@ -24941,7 +24947,7 @@
         </p:nvSpPr>
         <p:spPr>
           <a:xfrm>
-            <a:off x="5803264" y="4882278"/>
+            <a:off x="5803264" y="4758453"/>
             <a:ext cx="759542" cy="369332"/>
           </a:xfrm>
           <a:prstGeom prst="rect">
@@ -24971,7 +24977,7 @@
         </p:nvSpPr>
         <p:spPr>
           <a:xfrm>
-            <a:off x="4119125" y="5038707"/>
+            <a:off x="4119125" y="4914882"/>
             <a:ext cx="570681" cy="369332"/>
           </a:xfrm>
           <a:prstGeom prst="rect">
@@ -25001,7 +25007,7 @@
         </p:nvCxnSpPr>
         <p:spPr>
           <a:xfrm flipV="1">
-            <a:off x="4468828" y="4922702"/>
+            <a:off x="4468828" y="4798877"/>
             <a:ext cx="323623" cy="304800"/>
           </a:xfrm>
           <a:prstGeom prst="line">
@@ -25031,13 +25037,15 @@
       <p:cxnSp>
         <p:nvCxnSpPr>
           <p:cNvPr id="51" name="Straight Connector 50"/>
-          <p:cNvCxnSpPr/>
+          <p:cNvCxnSpPr>
+            <a:endCxn id="75" idx="1"/>
+          </p:cNvCxnSpPr>
           <p:nvPr/>
         </p:nvCxnSpPr>
         <p:spPr>
           <a:xfrm>
-            <a:off x="5246314" y="5755683"/>
-            <a:ext cx="2779498" cy="0"/>
+            <a:off x="5593872" y="5822358"/>
+            <a:ext cx="2178516" cy="0"/>
           </a:xfrm>
           <a:prstGeom prst="line">
             <a:avLst/>
@@ -25072,7 +25080,7 @@
         </p:nvSpPr>
         <p:spPr>
           <a:xfrm>
-            <a:off x="7772388" y="4263042"/>
+            <a:off x="7772388" y="4329717"/>
             <a:ext cx="821493" cy="1926745"/>
           </a:xfrm>
           <a:prstGeom prst="roundRect">
@@ -25122,7 +25130,7 @@
         </p:nvSpPr>
         <p:spPr>
           <a:xfrm rot="16200000">
-            <a:off x="7327030" y="4957567"/>
+            <a:off x="7327030" y="5024242"/>
             <a:ext cx="1720330" cy="338554"/>
           </a:xfrm>
           <a:prstGeom prst="rect">
@@ -25153,8 +25161,8 @@
         </p:nvCxnSpPr>
         <p:spPr>
           <a:xfrm flipV="1">
-            <a:off x="5246314" y="5090258"/>
-            <a:ext cx="0" cy="665425"/>
+            <a:off x="5608264" y="4966434"/>
+            <a:ext cx="0" cy="866557"/>
           </a:xfrm>
           <a:prstGeom prst="line">
             <a:avLst/>
@@ -25189,7 +25197,7 @@
         </p:nvSpPr>
         <p:spPr>
           <a:xfrm>
-            <a:off x="5298597" y="5708655"/>
+            <a:off x="5593872" y="5775330"/>
             <a:ext cx="570681" cy="369332"/>
           </a:xfrm>
           <a:prstGeom prst="rect">
@@ -25219,7 +25227,7 @@
         </p:nvCxnSpPr>
         <p:spPr>
           <a:xfrm flipV="1">
-            <a:off x="5531337" y="5613916"/>
+            <a:off x="5826612" y="5680591"/>
             <a:ext cx="323623" cy="304800"/>
           </a:xfrm>
           <a:prstGeom prst="line">
@@ -25254,7 +25262,7 @@
         </p:nvSpPr>
         <p:spPr>
           <a:xfrm>
-            <a:off x="7772388" y="5571017"/>
+            <a:off x="7772388" y="5637692"/>
             <a:ext cx="821492" cy="369332"/>
           </a:xfrm>
           <a:prstGeom prst="rect">
@@ -25287,7 +25295,7 @@
         </p:nvCxnSpPr>
         <p:spPr>
           <a:xfrm>
-            <a:off x="8593880" y="5755683"/>
+            <a:off x="8593880" y="5822358"/>
             <a:ext cx="379999" cy="0"/>
           </a:xfrm>
           <a:prstGeom prst="line">
@@ -25323,7 +25331,7 @@
         </p:nvSpPr>
         <p:spPr>
           <a:xfrm>
-            <a:off x="8527313" y="3930029"/>
+            <a:off x="8527313" y="3996704"/>
             <a:ext cx="576930" cy="1815882"/>
           </a:xfrm>
           <a:prstGeom prst="rect">
@@ -25435,7 +25443,7 @@
         </p:nvSpPr>
         <p:spPr>
           <a:xfrm>
-            <a:off x="7775926" y="1809230"/>
+            <a:off x="7775926" y="1685405"/>
             <a:ext cx="821493" cy="2288104"/>
           </a:xfrm>
           <a:prstGeom prst="roundRect">
@@ -25485,7 +25493,7 @@
         </p:nvSpPr>
         <p:spPr>
           <a:xfrm rot="16200000">
-            <a:off x="7279374" y="2874509"/>
+            <a:off x="7279374" y="2750684"/>
             <a:ext cx="1354867" cy="338554"/>
           </a:xfrm>
           <a:prstGeom prst="rect">
@@ -25516,7 +25524,7 @@
         </p:nvSpPr>
         <p:spPr>
           <a:xfrm>
-            <a:off x="8417932" y="1743169"/>
+            <a:off x="8417932" y="1619344"/>
             <a:ext cx="743014" cy="523220"/>
           </a:xfrm>
           <a:prstGeom prst="rect">
@@ -25565,7 +25573,7 @@
         </p:nvCxnSpPr>
         <p:spPr>
           <a:xfrm>
-            <a:off x="7411689" y="1988145"/>
+            <a:off x="7411689" y="1864320"/>
             <a:ext cx="361496" cy="0"/>
           </a:xfrm>
           <a:prstGeom prst="line">
@@ -25602,7 +25610,7 @@
         </p:nvSpPr>
         <p:spPr>
           <a:xfrm>
-            <a:off x="7773185" y="1803479"/>
+            <a:off x="7773185" y="1679654"/>
             <a:ext cx="533400" cy="369332"/>
           </a:xfrm>
           <a:prstGeom prst="rect">
@@ -25632,7 +25640,7 @@
         </p:nvSpPr>
         <p:spPr>
           <a:xfrm>
-            <a:off x="6878289" y="1803479"/>
+            <a:off x="6878289" y="1679654"/>
             <a:ext cx="533400" cy="369332"/>
           </a:xfrm>
           <a:prstGeom prst="rect">
@@ -25666,7 +25674,7 @@
         </p:nvCxnSpPr>
         <p:spPr>
           <a:xfrm>
-            <a:off x="7415227" y="2214976"/>
+            <a:off x="7415227" y="2091151"/>
             <a:ext cx="361496" cy="0"/>
           </a:xfrm>
           <a:prstGeom prst="line">
@@ -25702,7 +25710,7 @@
         </p:nvSpPr>
         <p:spPr>
           <a:xfrm>
-            <a:off x="7776723" y="2030310"/>
+            <a:off x="7776723" y="1906485"/>
             <a:ext cx="533400" cy="369332"/>
           </a:xfrm>
           <a:prstGeom prst="rect">
@@ -25732,7 +25740,7 @@
         </p:nvSpPr>
         <p:spPr>
           <a:xfrm>
-            <a:off x="6881827" y="2030310"/>
+            <a:off x="6881827" y="1906485"/>
             <a:ext cx="533400" cy="369332"/>
           </a:xfrm>
           <a:prstGeom prst="rect">
@@ -25765,7 +25773,7 @@
         </p:nvCxnSpPr>
         <p:spPr>
           <a:xfrm>
-            <a:off x="8306585" y="1988145"/>
+            <a:off x="8306585" y="1864320"/>
             <a:ext cx="767265" cy="0"/>
           </a:xfrm>
           <a:prstGeom prst="line">
@@ -25801,7 +25809,7 @@
         </p:nvCxnSpPr>
         <p:spPr>
           <a:xfrm flipV="1">
-            <a:off x="8310123" y="2204205"/>
+            <a:off x="8310123" y="2080380"/>
             <a:ext cx="763727" cy="138"/>
           </a:xfrm>
           <a:prstGeom prst="line">
@@ -25837,7 +25845,7 @@
         </p:nvCxnSpPr>
         <p:spPr>
           <a:xfrm flipV="1">
-            <a:off x="2356366" y="2136278"/>
+            <a:off x="2356366" y="2012453"/>
             <a:ext cx="0" cy="2369240"/>
           </a:xfrm>
           <a:prstGeom prst="line">
@@ -25875,7 +25883,7 @@
         </p:nvCxnSpPr>
         <p:spPr>
           <a:xfrm>
-            <a:off x="2335100" y="2136277"/>
+            <a:off x="2335100" y="2012452"/>
             <a:ext cx="388652" cy="1"/>
           </a:xfrm>
           <a:prstGeom prst="line">
@@ -25911,7 +25919,7 @@
         </p:nvSpPr>
         <p:spPr>
           <a:xfrm>
-            <a:off x="8063814" y="3428941"/>
+            <a:off x="8063814" y="3305116"/>
             <a:ext cx="533400" cy="369332"/>
           </a:xfrm>
           <a:prstGeom prst="rect">
@@ -25942,7 +25950,7 @@
         </p:nvSpPr>
         <p:spPr>
           <a:xfrm>
-            <a:off x="7690983" y="3634506"/>
+            <a:off x="7690983" y="3510681"/>
             <a:ext cx="909769" cy="369332"/>
           </a:xfrm>
           <a:prstGeom prst="rect">
@@ -25973,7 +25981,7 @@
         </p:nvCxnSpPr>
         <p:spPr>
           <a:xfrm>
-            <a:off x="8600752" y="3608975"/>
+            <a:off x="8600752" y="3485150"/>
             <a:ext cx="476636" cy="4633"/>
           </a:xfrm>
           <a:prstGeom prst="line">
@@ -26009,7 +26017,7 @@
         </p:nvCxnSpPr>
         <p:spPr>
           <a:xfrm flipV="1">
-            <a:off x="8600752" y="3819036"/>
+            <a:off x="8600752" y="3695211"/>
             <a:ext cx="476636" cy="136"/>
           </a:xfrm>
           <a:prstGeom prst="line">
@@ -26045,7 +26053,7 @@
         </p:nvSpPr>
         <p:spPr>
           <a:xfrm>
-            <a:off x="8272608" y="3347365"/>
+            <a:off x="8272608" y="3223540"/>
             <a:ext cx="743014" cy="523220"/>
           </a:xfrm>
           <a:prstGeom prst="rect">
@@ -26094,7 +26102,7 @@
         </p:nvSpPr>
         <p:spPr>
           <a:xfrm>
-            <a:off x="6910388" y="6381750"/>
+            <a:off x="6910388" y="6257925"/>
             <a:ext cx="2133600" cy="476250"/>
           </a:xfrm>
         </p:spPr>
@@ -26128,14 +26136,15 @@
         <p:nvCxnSpPr>
           <p:cNvPr id="65" name="Straight Connector 64"/>
           <p:cNvCxnSpPr>
+            <a:stCxn id="97" idx="3"/>
             <a:endCxn id="66" idx="1"/>
           </p:cNvCxnSpPr>
           <p:nvPr/>
         </p:nvCxnSpPr>
         <p:spPr>
           <a:xfrm>
-            <a:off x="2217615" y="5364640"/>
-            <a:ext cx="3594386" cy="0"/>
+            <a:off x="5416319" y="5355115"/>
+            <a:ext cx="395682" cy="0"/>
           </a:xfrm>
           <a:prstGeom prst="line">
             <a:avLst/>
@@ -26171,7 +26180,7 @@
         </p:nvSpPr>
         <p:spPr>
           <a:xfrm>
-            <a:off x="5812001" y="5179974"/>
+            <a:off x="5812001" y="5170449"/>
             <a:ext cx="992856" cy="369332"/>
           </a:xfrm>
           <a:prstGeom prst="rect">
@@ -26195,14 +26204,246 @@
       </p:sp>
       <p:sp>
         <p:nvSpPr>
+          <p:cNvPr id="72" name="TextBox 71"/>
+          <p:cNvSpPr txBox="1"/>
+          <p:nvPr/>
+        </p:nvSpPr>
+        <p:spPr>
+          <a:xfrm>
+            <a:off x="780056" y="4581945"/>
+            <a:ext cx="992856" cy="369332"/>
+          </a:xfrm>
+          <a:prstGeom prst="rect">
+            <a:avLst/>
+          </a:prstGeom>
+          <a:noFill/>
+        </p:spPr>
+        <p:txBody>
+          <a:bodyPr wrap="square" lIns="91440" tIns="45720" rIns="91440" bIns="45720" rtlCol="0">
+            <a:spAutoFit/>
+          </a:bodyPr>
+          <a:lstStyle/>
+          <a:p>
+            <a:pPr algn="ctr"/>
+            <a:r>
+              <a:rPr lang="en-US" sz="1800" dirty="0" err="1" smtClean="0"/>
+              <a:t>myISR</a:t>
+            </a:r>
+            <a:r>
+              <a:rPr lang="en-US" sz="1800" dirty="0" smtClean="0"/>
+              <a:t>()</a:t>
+            </a:r>
+            <a:endParaRPr lang="en-US" sz="1800" dirty="0"/>
+          </a:p>
+        </p:txBody>
+      </p:sp>
+      <p:sp>
+        <p:nvSpPr>
+          <p:cNvPr id="77" name="TextBox 76"/>
+          <p:cNvSpPr txBox="1"/>
+          <p:nvPr/>
+        </p:nvSpPr>
+        <p:spPr>
+          <a:xfrm>
+            <a:off x="780056" y="4293915"/>
+            <a:ext cx="992856" cy="369332"/>
+          </a:xfrm>
+          <a:prstGeom prst="rect">
+            <a:avLst/>
+          </a:prstGeom>
+          <a:noFill/>
+        </p:spPr>
+        <p:txBody>
+          <a:bodyPr wrap="square" lIns="91440" tIns="45720" rIns="91440" bIns="45720" rtlCol="0">
+            <a:spAutoFit/>
+          </a:bodyPr>
+          <a:lstStyle/>
+          <a:p>
+            <a:pPr algn="ctr"/>
+            <a:r>
+              <a:rPr lang="en-US" sz="1800" dirty="0" smtClean="0"/>
+              <a:t>main()</a:t>
+            </a:r>
+            <a:endParaRPr lang="en-US" sz="1800" dirty="0"/>
+          </a:p>
+        </p:txBody>
+      </p:sp>
+      <p:sp>
+        <p:nvSpPr>
+          <p:cNvPr id="78" name="TextBox 77"/>
+          <p:cNvSpPr txBox="1"/>
+          <p:nvPr/>
+        </p:nvSpPr>
+        <p:spPr>
+          <a:xfrm>
+            <a:off x="3559000" y="5048593"/>
+            <a:ext cx="917391" cy="338554"/>
+          </a:xfrm>
+          <a:prstGeom prst="rect">
+            <a:avLst/>
+          </a:prstGeom>
+          <a:noFill/>
+        </p:spPr>
+        <p:txBody>
+          <a:bodyPr wrap="square" lIns="91440" tIns="45720" rIns="91440" bIns="45720" rtlCol="0">
+            <a:spAutoFit/>
+          </a:bodyPr>
+          <a:lstStyle/>
+          <a:p>
+            <a:pPr algn="r"/>
+            <a:r>
+              <a:rPr lang="en-US" sz="1600" dirty="0" smtClean="0"/>
+              <a:t>slv_reg2</a:t>
+            </a:r>
+            <a:endParaRPr lang="en-US" sz="2000" dirty="0"/>
+          </a:p>
+        </p:txBody>
+      </p:sp>
+      <p:sp>
+        <p:nvSpPr>
+          <p:cNvPr id="26" name="TextBox 25"/>
+          <p:cNvSpPr txBox="1"/>
+          <p:nvPr/>
+        </p:nvSpPr>
+        <p:spPr>
+          <a:xfrm>
+            <a:off x="531371" y="3118212"/>
+            <a:ext cx="1524000" cy="369332"/>
+          </a:xfrm>
+          <a:prstGeom prst="rect">
+            <a:avLst/>
+          </a:prstGeom>
+          <a:noFill/>
+        </p:spPr>
+        <p:txBody>
+          <a:bodyPr wrap="square" lIns="91440" tIns="45720" rIns="91440" bIns="45720" rtlCol="0">
+            <a:spAutoFit/>
+          </a:bodyPr>
+          <a:lstStyle/>
+          <a:p>
+            <a:pPr algn="ctr"/>
+            <a:r>
+              <a:rPr lang="en-US" sz="1800" b="1" dirty="0" smtClean="0"/>
+              <a:t>Lec19.c</a:t>
+            </a:r>
+            <a:endParaRPr lang="en-US" sz="4400" b="1" dirty="0"/>
+          </a:p>
+        </p:txBody>
+      </p:sp>
+      <p:cxnSp>
+        <p:nvCxnSpPr>
+          <p:cNvPr id="106" name="Straight Connector 105"/>
+          <p:cNvCxnSpPr/>
+          <p:nvPr/>
+        </p:nvCxnSpPr>
+        <p:spPr>
+          <a:xfrm flipV="1">
+            <a:off x="2217615" y="4381692"/>
+            <a:ext cx="506137" cy="1"/>
+          </a:xfrm>
+          <a:prstGeom prst="line">
+            <a:avLst/>
+          </a:prstGeom>
+          <a:ln w="50800">
+            <a:solidFill>
+              <a:schemeClr val="tx1"/>
+            </a:solidFill>
+            <a:tailEnd type="none"/>
+          </a:ln>
+        </p:spPr>
+        <p:style>
+          <a:lnRef idx="1">
+            <a:schemeClr val="accent1"/>
+          </a:lnRef>
+          <a:fillRef idx="0">
+            <a:schemeClr val="accent1"/>
+          </a:fillRef>
+          <a:effectRef idx="0">
+            <a:schemeClr val="accent1"/>
+          </a:effectRef>
+          <a:fontRef idx="minor">
+            <a:schemeClr val="tx1"/>
+          </a:fontRef>
+        </p:style>
+      </p:cxnSp>
+      <p:cxnSp>
+        <p:nvCxnSpPr>
+          <p:cNvPr id="90" name="Straight Connector 89"/>
+          <p:cNvCxnSpPr/>
+          <p:nvPr/>
+        </p:nvCxnSpPr>
+        <p:spPr>
+          <a:xfrm>
+            <a:off x="2227140" y="5355115"/>
+            <a:ext cx="3594386" cy="0"/>
+          </a:xfrm>
+          <a:prstGeom prst="line">
+            <a:avLst/>
+          </a:prstGeom>
+          <a:ln w="12700">
+            <a:solidFill>
+              <a:schemeClr val="tx1"/>
+            </a:solidFill>
+            <a:headEnd type="triangle"/>
+            <a:tailEnd type="none"/>
+          </a:ln>
+        </p:spPr>
+        <p:style>
+          <a:lnRef idx="1">
+            <a:schemeClr val="accent1"/>
+          </a:lnRef>
+          <a:fillRef idx="0">
+            <a:schemeClr val="accent1"/>
+          </a:fillRef>
+          <a:effectRef idx="0">
+            <a:schemeClr val="accent1"/>
+          </a:effectRef>
+          <a:fontRef idx="minor">
+            <a:schemeClr val="tx1"/>
+          </a:fontRef>
+        </p:style>
+      </p:cxnSp>
+      <p:sp>
+        <p:nvSpPr>
+          <p:cNvPr id="91" name="TextBox 90"/>
+          <p:cNvSpPr txBox="1"/>
+          <p:nvPr/>
+        </p:nvSpPr>
+        <p:spPr>
+          <a:xfrm>
+            <a:off x="1220636" y="5170449"/>
+            <a:ext cx="992856" cy="369332"/>
+          </a:xfrm>
+          <a:prstGeom prst="rect">
+            <a:avLst/>
+          </a:prstGeom>
+          <a:noFill/>
+        </p:spPr>
+        <p:txBody>
+          <a:bodyPr wrap="square" lIns="91440" tIns="45720" rIns="91440" bIns="45720" rtlCol="0">
+            <a:spAutoFit/>
+          </a:bodyPr>
+          <a:lstStyle/>
+          <a:p>
+            <a:pPr algn="r"/>
+            <a:r>
+              <a:rPr lang="en-US" sz="1800" dirty="0" smtClean="0"/>
+              <a:t>Interrupt</a:t>
+            </a:r>
+            <a:endParaRPr lang="en-US" sz="1800" dirty="0"/>
+          </a:p>
+        </p:txBody>
+      </p:sp>
+      <p:sp>
+        <p:nvSpPr>
           <p:cNvPr id="30" name="Rounded Rectangle 29"/>
           <p:cNvSpPr/>
           <p:nvPr/>
         </p:nvSpPr>
         <p:spPr>
           <a:xfrm>
-            <a:off x="2723753" y="3242037"/>
-            <a:ext cx="904766" cy="2778934"/>
+            <a:off x="2723753" y="3118212"/>
+            <a:ext cx="904766" cy="2935472"/>
           </a:xfrm>
           <a:prstGeom prst="roundRect">
             <a:avLst>
@@ -26243,6 +26484,37 @@
           </a:p>
         </p:txBody>
       </p:sp>
+      <p:sp>
+        <p:nvSpPr>
+          <p:cNvPr id="31" name="TextBox 30"/>
+          <p:cNvSpPr txBox="1"/>
+          <p:nvPr/>
+        </p:nvSpPr>
+        <p:spPr>
+          <a:xfrm>
+            <a:off x="2727689" y="3115864"/>
+            <a:ext cx="900829" cy="369332"/>
+          </a:xfrm>
+          <a:prstGeom prst="rect">
+            <a:avLst/>
+          </a:prstGeom>
+          <a:noFill/>
+        </p:spPr>
+        <p:txBody>
+          <a:bodyPr wrap="square" lIns="91440" tIns="45720" rIns="91440" bIns="45720" rtlCol="0">
+            <a:spAutoFit/>
+          </a:bodyPr>
+          <a:lstStyle/>
+          <a:p>
+            <a:pPr algn="ctr"/>
+            <a:r>
+              <a:rPr lang="en-US" sz="1800" b="1" dirty="0" err="1" smtClean="0"/>
+              <a:t>axi_lite</a:t>
+            </a:r>
+            <a:endParaRPr lang="en-US" sz="4400" b="1" dirty="0"/>
+          </a:p>
+        </p:txBody>
+      </p:sp>
       <p:cxnSp>
         <p:nvCxnSpPr>
           <p:cNvPr id="69" name="Straight Connector 68"/>
@@ -26251,7 +26523,7 @@
         </p:nvCxnSpPr>
         <p:spPr>
           <a:xfrm>
-            <a:off x="2727689" y="5364640"/>
+            <a:off x="2727689" y="5355115"/>
             <a:ext cx="900830" cy="0"/>
           </a:xfrm>
           <a:prstGeom prst="line">
@@ -26280,215 +26552,28 @@
           </a:fontRef>
         </p:style>
       </p:cxnSp>
-      <p:sp>
-        <p:nvSpPr>
-          <p:cNvPr id="71" name="TextBox 70"/>
-          <p:cNvSpPr txBox="1"/>
-          <p:nvPr/>
-        </p:nvSpPr>
-        <p:spPr>
-          <a:xfrm>
-            <a:off x="1211111" y="5179974"/>
-            <a:ext cx="992856" cy="369332"/>
-          </a:xfrm>
-          <a:prstGeom prst="rect">
-            <a:avLst/>
-          </a:prstGeom>
-          <a:noFill/>
-        </p:spPr>
-        <p:txBody>
-          <a:bodyPr wrap="square" lIns="91440" tIns="45720" rIns="91440" bIns="45720" rtlCol="0">
-            <a:spAutoFit/>
-          </a:bodyPr>
-          <a:lstStyle/>
-          <a:p>
-            <a:pPr algn="r"/>
-            <a:r>
-              <a:rPr lang="en-US" sz="1800" dirty="0" smtClean="0"/>
-              <a:t>Interrupt</a:t>
-            </a:r>
-            <a:endParaRPr lang="en-US" sz="1800" dirty="0"/>
-          </a:p>
-        </p:txBody>
-      </p:sp>
-      <p:sp>
-        <p:nvSpPr>
-          <p:cNvPr id="72" name="TextBox 71"/>
-          <p:cNvSpPr txBox="1"/>
-          <p:nvPr/>
-        </p:nvSpPr>
-        <p:spPr>
-          <a:xfrm>
-            <a:off x="780056" y="4705770"/>
-            <a:ext cx="992856" cy="369332"/>
-          </a:xfrm>
-          <a:prstGeom prst="rect">
-            <a:avLst/>
-          </a:prstGeom>
-          <a:noFill/>
-        </p:spPr>
-        <p:txBody>
-          <a:bodyPr wrap="square" lIns="91440" tIns="45720" rIns="91440" bIns="45720" rtlCol="0">
-            <a:spAutoFit/>
-          </a:bodyPr>
-          <a:lstStyle/>
-          <a:p>
-            <a:pPr algn="ctr"/>
-            <a:r>
-              <a:rPr lang="en-US" sz="1800" dirty="0" err="1" smtClean="0"/>
-              <a:t>myISR</a:t>
-            </a:r>
-            <a:r>
-              <a:rPr lang="en-US" sz="1800" dirty="0" smtClean="0"/>
-              <a:t>()</a:t>
-            </a:r>
-            <a:endParaRPr lang="en-US" sz="1800" dirty="0"/>
-          </a:p>
-        </p:txBody>
-      </p:sp>
-      <p:sp>
-        <p:nvSpPr>
-          <p:cNvPr id="77" name="TextBox 76"/>
-          <p:cNvSpPr txBox="1"/>
-          <p:nvPr/>
-        </p:nvSpPr>
-        <p:spPr>
-          <a:xfrm>
-            <a:off x="780056" y="4417740"/>
-            <a:ext cx="992856" cy="369332"/>
-          </a:xfrm>
-          <a:prstGeom prst="rect">
-            <a:avLst/>
-          </a:prstGeom>
-          <a:noFill/>
-        </p:spPr>
-        <p:txBody>
-          <a:bodyPr wrap="square" lIns="91440" tIns="45720" rIns="91440" bIns="45720" rtlCol="0">
-            <a:spAutoFit/>
-          </a:bodyPr>
-          <a:lstStyle/>
-          <a:p>
-            <a:pPr algn="ctr"/>
-            <a:r>
-              <a:rPr lang="en-US" sz="1800" dirty="0" smtClean="0"/>
-              <a:t>main()</a:t>
-            </a:r>
-            <a:endParaRPr lang="en-US" sz="1800" dirty="0"/>
-          </a:p>
-        </p:txBody>
-      </p:sp>
-      <p:sp>
-        <p:nvSpPr>
-          <p:cNvPr id="78" name="TextBox 77"/>
-          <p:cNvSpPr txBox="1"/>
-          <p:nvPr/>
-        </p:nvSpPr>
-        <p:spPr>
-          <a:xfrm>
-            <a:off x="4325023" y="5058118"/>
-            <a:ext cx="1446034" cy="338554"/>
-          </a:xfrm>
-          <a:prstGeom prst="rect">
-            <a:avLst/>
-          </a:prstGeom>
-          <a:noFill/>
-        </p:spPr>
-        <p:txBody>
-          <a:bodyPr wrap="square" lIns="91440" tIns="45720" rIns="91440" bIns="45720" rtlCol="0">
-            <a:spAutoFit/>
-          </a:bodyPr>
-          <a:lstStyle/>
-          <a:p>
-            <a:pPr algn="r"/>
-            <a:r>
-              <a:rPr lang="en-US" sz="1600" dirty="0" smtClean="0"/>
-              <a:t>slv_reg2</a:t>
-            </a:r>
-            <a:endParaRPr lang="en-US" sz="2000" dirty="0"/>
-          </a:p>
-        </p:txBody>
-      </p:sp>
-      <p:sp>
-        <p:nvSpPr>
-          <p:cNvPr id="26" name="TextBox 25"/>
-          <p:cNvSpPr txBox="1"/>
-          <p:nvPr/>
-        </p:nvSpPr>
-        <p:spPr>
-          <a:xfrm>
-            <a:off x="531371" y="3242037"/>
-            <a:ext cx="1524000" cy="369332"/>
-          </a:xfrm>
-          <a:prstGeom prst="rect">
-            <a:avLst/>
-          </a:prstGeom>
-          <a:noFill/>
-        </p:spPr>
-        <p:txBody>
-          <a:bodyPr wrap="square" lIns="91440" tIns="45720" rIns="91440" bIns="45720" rtlCol="0">
-            <a:spAutoFit/>
-          </a:bodyPr>
-          <a:lstStyle/>
-          <a:p>
-            <a:pPr algn="ctr"/>
-            <a:r>
-              <a:rPr lang="en-US" sz="1800" b="1" dirty="0" smtClean="0"/>
-              <a:t>Lec19.c</a:t>
-            </a:r>
-            <a:endParaRPr lang="en-US" sz="4400" b="1" dirty="0"/>
-          </a:p>
-        </p:txBody>
-      </p:sp>
-      <p:sp>
-        <p:nvSpPr>
-          <p:cNvPr id="31" name="TextBox 30"/>
-          <p:cNvSpPr txBox="1"/>
-          <p:nvPr/>
-        </p:nvSpPr>
-        <p:spPr>
-          <a:xfrm>
-            <a:off x="2727689" y="3239689"/>
-            <a:ext cx="900829" cy="369332"/>
-          </a:xfrm>
-          <a:prstGeom prst="rect">
-            <a:avLst/>
-          </a:prstGeom>
-          <a:noFill/>
-        </p:spPr>
-        <p:txBody>
-          <a:bodyPr wrap="square" lIns="91440" tIns="45720" rIns="91440" bIns="45720" rtlCol="0">
-            <a:spAutoFit/>
-          </a:bodyPr>
-          <a:lstStyle/>
-          <a:p>
-            <a:pPr algn="ctr"/>
-            <a:r>
-              <a:rPr lang="en-US" sz="1800" b="1" dirty="0" err="1" smtClean="0"/>
-              <a:t>axi_lite</a:t>
-            </a:r>
-            <a:endParaRPr lang="en-US" sz="4400" b="1" dirty="0"/>
-          </a:p>
-        </p:txBody>
-      </p:sp>
       <p:cxnSp>
         <p:nvCxnSpPr>
-          <p:cNvPr id="106" name="Straight Connector 105"/>
-          <p:cNvCxnSpPr/>
+          <p:cNvPr id="100" name="Straight Connector 99"/>
+          <p:cNvCxnSpPr>
+            <a:endCxn id="99" idx="1"/>
+          </p:cNvCxnSpPr>
           <p:nvPr/>
         </p:nvCxnSpPr>
         <p:spPr>
-          <a:xfrm flipV="1">
-            <a:off x="2217615" y="4505517"/>
-            <a:ext cx="506137" cy="1"/>
+          <a:xfrm>
+            <a:off x="3628519" y="5648325"/>
+            <a:ext cx="829013" cy="0"/>
           </a:xfrm>
           <a:prstGeom prst="line">
             <a:avLst/>
           </a:prstGeom>
-          <a:ln w="50800">
+          <a:ln w="12700">
             <a:solidFill>
               <a:schemeClr val="tx1"/>
             </a:solidFill>
-            <a:tailEnd type="none"/>
+            <a:headEnd type="none"/>
+            <a:tailEnd type="triangle"/>
           </a:ln>
         </p:spPr>
         <p:style>
@@ -26506,6 +26591,221 @@
           </a:fontRef>
         </p:style>
       </p:cxnSp>
+      <p:sp>
+        <p:nvSpPr>
+          <p:cNvPr id="101" name="TextBox 100"/>
+          <p:cNvSpPr txBox="1"/>
+          <p:nvPr/>
+        </p:nvSpPr>
+        <p:spPr>
+          <a:xfrm>
+            <a:off x="2673763" y="5460678"/>
+            <a:ext cx="992856" cy="369332"/>
+          </a:xfrm>
+          <a:prstGeom prst="rect">
+            <a:avLst/>
+          </a:prstGeom>
+          <a:noFill/>
+        </p:spPr>
+        <p:txBody>
+          <a:bodyPr wrap="square" lIns="91440" tIns="45720" rIns="91440" bIns="45720" rtlCol="0">
+            <a:spAutoFit/>
+          </a:bodyPr>
+          <a:lstStyle/>
+          <a:p>
+            <a:pPr algn="r"/>
+            <a:r>
+              <a:rPr lang="en-US" sz="1800" dirty="0" smtClean="0"/>
+              <a:t>slv</a:t>
+            </a:r>
+            <a:r>
+              <a:rPr lang="en-US" sz="1800" dirty="0" smtClean="0"/>
+              <a:t>_reg3</a:t>
+            </a:r>
+            <a:endParaRPr lang="en-US" sz="1800" dirty="0"/>
+          </a:p>
+        </p:txBody>
+      </p:sp>
+      <p:cxnSp>
+        <p:nvCxnSpPr>
+          <p:cNvPr id="102" name="Straight Connector 101"/>
+          <p:cNvCxnSpPr>
+            <a:endCxn id="66" idx="1"/>
+          </p:cNvCxnSpPr>
+          <p:nvPr/>
+        </p:nvCxnSpPr>
+        <p:spPr>
+          <a:xfrm>
+            <a:off x="3628518" y="5355115"/>
+            <a:ext cx="2183483" cy="0"/>
+          </a:xfrm>
+          <a:prstGeom prst="line">
+            <a:avLst/>
+          </a:prstGeom>
+          <a:ln w="12700">
+            <a:solidFill>
+              <a:schemeClr val="tx1"/>
+            </a:solidFill>
+            <a:headEnd type="triangle"/>
+            <a:tailEnd type="none"/>
+          </a:ln>
+        </p:spPr>
+        <p:style>
+          <a:lnRef idx="1">
+            <a:schemeClr val="accent1"/>
+          </a:lnRef>
+          <a:fillRef idx="0">
+            <a:schemeClr val="accent1"/>
+          </a:fillRef>
+          <a:effectRef idx="0">
+            <a:schemeClr val="accent1"/>
+          </a:effectRef>
+          <a:fontRef idx="minor">
+            <a:schemeClr val="tx1"/>
+          </a:fontRef>
+        </p:style>
+      </p:cxnSp>
+      <p:sp>
+        <p:nvSpPr>
+          <p:cNvPr id="87" name="Rounded Rectangle 86"/>
+          <p:cNvSpPr/>
+          <p:nvPr/>
+        </p:nvSpPr>
+        <p:spPr>
+          <a:xfrm>
+            <a:off x="4457532" y="5175748"/>
+            <a:ext cx="962193" cy="784247"/>
+          </a:xfrm>
+          <a:prstGeom prst="roundRect">
+            <a:avLst>
+              <a:gd name="adj" fmla="val 13495"/>
+            </a:avLst>
+          </a:prstGeom>
+          <a:solidFill>
+            <a:schemeClr val="bg1"/>
+          </a:solidFill>
+          <a:ln>
+            <a:solidFill>
+              <a:schemeClr val="tx1"/>
+            </a:solidFill>
+          </a:ln>
+        </p:spPr>
+        <p:style>
+          <a:lnRef idx="2">
+            <a:schemeClr val="accent1">
+              <a:shade val="50000"/>
+            </a:schemeClr>
+          </a:lnRef>
+          <a:fillRef idx="1">
+            <a:schemeClr val="accent1"/>
+          </a:fillRef>
+          <a:effectRef idx="0">
+            <a:schemeClr val="accent1"/>
+          </a:effectRef>
+          <a:fontRef idx="minor">
+            <a:schemeClr val="lt1"/>
+          </a:fontRef>
+        </p:style>
+        <p:txBody>
+          <a:bodyPr lIns="91440" tIns="45720" rIns="91440" bIns="45720" spcCol="0" rtlCol="0" anchor="ctr"/>
+          <a:lstStyle/>
+          <a:p>
+            <a:pPr algn="ctr"/>
+            <a:endParaRPr lang="en-US" sz="1800"/>
+          </a:p>
+        </p:txBody>
+      </p:sp>
+      <p:sp>
+        <p:nvSpPr>
+          <p:cNvPr id="96" name="TextBox 95"/>
+          <p:cNvSpPr txBox="1"/>
+          <p:nvPr/>
+        </p:nvSpPr>
+        <p:spPr>
+          <a:xfrm>
+            <a:off x="4417134" y="5170449"/>
+            <a:ext cx="741282" cy="369332"/>
+          </a:xfrm>
+          <a:prstGeom prst="rect">
+            <a:avLst/>
+          </a:prstGeom>
+          <a:noFill/>
+        </p:spPr>
+        <p:txBody>
+          <a:bodyPr wrap="square" lIns="91440" tIns="45720" rIns="91440" bIns="45720" rtlCol="0">
+            <a:spAutoFit/>
+          </a:bodyPr>
+          <a:lstStyle/>
+          <a:p>
+            <a:r>
+              <a:rPr lang="en-US" sz="1800" dirty="0" err="1" smtClean="0"/>
+              <a:t>flagQ</a:t>
+            </a:r>
+            <a:endParaRPr lang="en-US" sz="1800" dirty="0"/>
+          </a:p>
+        </p:txBody>
+      </p:sp>
+      <p:sp>
+        <p:nvSpPr>
+          <p:cNvPr id="97" name="TextBox 96"/>
+          <p:cNvSpPr txBox="1"/>
+          <p:nvPr/>
+        </p:nvSpPr>
+        <p:spPr>
+          <a:xfrm>
+            <a:off x="4675037" y="5170449"/>
+            <a:ext cx="741282" cy="369332"/>
+          </a:xfrm>
+          <a:prstGeom prst="rect">
+            <a:avLst/>
+          </a:prstGeom>
+          <a:noFill/>
+        </p:spPr>
+        <p:txBody>
+          <a:bodyPr wrap="square" lIns="91440" tIns="45720" rIns="91440" bIns="45720" rtlCol="0">
+            <a:spAutoFit/>
+          </a:bodyPr>
+          <a:lstStyle/>
+          <a:p>
+            <a:pPr algn="r"/>
+            <a:r>
+              <a:rPr lang="en-US" sz="1800" dirty="0" smtClean="0"/>
+              <a:t>set</a:t>
+            </a:r>
+            <a:endParaRPr lang="en-US" sz="1800" dirty="0"/>
+          </a:p>
+        </p:txBody>
+      </p:sp>
+      <p:sp>
+        <p:nvSpPr>
+          <p:cNvPr id="99" name="TextBox 98"/>
+          <p:cNvSpPr txBox="1"/>
+          <p:nvPr/>
+        </p:nvSpPr>
+        <p:spPr>
+          <a:xfrm>
+            <a:off x="4457532" y="5463659"/>
+            <a:ext cx="992856" cy="369332"/>
+          </a:xfrm>
+          <a:prstGeom prst="rect">
+            <a:avLst/>
+          </a:prstGeom>
+          <a:noFill/>
+        </p:spPr>
+        <p:txBody>
+          <a:bodyPr wrap="square" lIns="91440" tIns="45720" rIns="91440" bIns="45720" rtlCol="0">
+            <a:spAutoFit/>
+          </a:bodyPr>
+          <a:lstStyle/>
+          <a:p>
+            <a:r>
+              <a:rPr lang="en-US" sz="1800" dirty="0" smtClean="0"/>
+              <a:t>clear</a:t>
+            </a:r>
+            <a:endParaRPr lang="en-US" sz="1800" dirty="0"/>
+          </a:p>
+        </p:txBody>
+      </p:sp>
     </p:spTree>
     <p:extLst>
       <p:ext uri="{BB962C8B-B14F-4D97-AF65-F5344CB8AC3E}">
@@ -26537,7 +26837,7 @@
                             </p:stCondLst>
                             <p:childTnLst>
                               <p:par>
-                                <p:cTn id="5" presetID="1" presetClass="entr" presetSubtype="0" fill="hold" grpId="0" nodeType="clickEffect">
+                                <p:cTn id="5" presetID="1" presetClass="entr" presetSubtype="0" fill="hold" nodeType="clickEffect">
                                   <p:stCondLst>
                                     <p:cond delay="0"/>
                                   </p:stCondLst>
@@ -26550,7 +26850,7 @@
                                           </p:stCondLst>
                                         </p:cTn>
                                         <p:tgtEl>
-                                          <p:spTgt spid="66"/>
+                                          <p:spTgt spid="69"/>
                                         </p:tgtEl>
                                         <p:attrNameLst>
                                           <p:attrName>style.visibility</p:attrName>
@@ -26577,7 +26877,7 @@
                                           </p:stCondLst>
                                         </p:cTn>
                                         <p:tgtEl>
-                                          <p:spTgt spid="65"/>
+                                          <p:spTgt spid="102"/>
                                         </p:tgtEl>
                                         <p:attrNameLst>
                                           <p:attrName>style.visibility</p:attrName>
@@ -26604,7 +26904,7 @@
                                           </p:stCondLst>
                                         </p:cTn>
                                         <p:tgtEl>
-                                          <p:spTgt spid="69"/>
+                                          <p:spTgt spid="90"/>
                                         </p:tgtEl>
                                         <p:attrNameLst>
                                           <p:attrName>style.visibility</p:attrName>
@@ -26631,7 +26931,7 @@
                                           </p:stCondLst>
                                         </p:cTn>
                                         <p:tgtEl>
-                                          <p:spTgt spid="71"/>
+                                          <p:spTgt spid="91"/>
                                         </p:tgtEl>
                                         <p:attrNameLst>
                                           <p:attrName>style.visibility</p:attrName>
@@ -26644,26 +26944,35 @@
                                   </p:childTnLst>
                                 </p:cTn>
                               </p:par>
-                            </p:childTnLst>
-                          </p:cTn>
-                        </p:par>
-                      </p:childTnLst>
-                    </p:cTn>
-                  </p:par>
-                  <p:par>
-                    <p:cTn id="13" fill="hold">
-                      <p:stCondLst>
-                        <p:cond delay="indefinite"/>
-                      </p:stCondLst>
-                      <p:childTnLst>
-                        <p:par>
-                          <p:cTn id="14" fill="hold">
-                            <p:stCondLst>
-                              <p:cond delay="0"/>
-                            </p:stCondLst>
-                            <p:childTnLst>
                               <p:par>
-                                <p:cTn id="15" presetID="1" presetClass="entr" presetSubtype="0" fill="hold" grpId="0" nodeType="clickEffect">
+                                <p:cTn id="13" presetID="1" presetClass="entr" presetSubtype="0" fill="hold" grpId="0" nodeType="withEffect">
+                                  <p:stCondLst>
+                                    <p:cond delay="0"/>
+                                  </p:stCondLst>
+                                  <p:childTnLst>
+                                    <p:set>
+                                      <p:cBhvr>
+                                        <p:cTn id="14" dur="1" fill="hold">
+                                          <p:stCondLst>
+                                            <p:cond delay="0"/>
+                                          </p:stCondLst>
+                                        </p:cTn>
+                                        <p:tgtEl>
+                                          <p:spTgt spid="66"/>
+                                        </p:tgtEl>
+                                        <p:attrNameLst>
+                                          <p:attrName>style.visibility</p:attrName>
+                                        </p:attrNameLst>
+                                      </p:cBhvr>
+                                      <p:to>
+                                        <p:strVal val="visible"/>
+                                      </p:to>
+                                    </p:set>
+                                  </p:childTnLst>
+                                </p:cTn>
+                              </p:par>
+                              <p:par>
+                                <p:cTn id="15" presetID="1" presetClass="entr" presetSubtype="0" fill="hold" grpId="0" nodeType="withEffect">
                                   <p:stCondLst>
                                     <p:cond delay="0"/>
                                   </p:stCondLst>
@@ -26676,7 +26985,7 @@
                                           </p:stCondLst>
                                         </p:cTn>
                                         <p:tgtEl>
-                                          <p:spTgt spid="72"/>
+                                          <p:spTgt spid="78"/>
                                         </p:tgtEl>
                                         <p:attrNameLst>
                                           <p:attrName>style.visibility</p:attrName>
@@ -26721,7 +27030,232 @@
                                           </p:stCondLst>
                                         </p:cTn>
                                         <p:tgtEl>
-                                          <p:spTgt spid="78"/>
+                                          <p:spTgt spid="72"/>
+                                        </p:tgtEl>
+                                        <p:attrNameLst>
+                                          <p:attrName>style.visibility</p:attrName>
+                                        </p:attrNameLst>
+                                      </p:cBhvr>
+                                      <p:to>
+                                        <p:strVal val="visible"/>
+                                      </p:to>
+                                    </p:set>
+                                  </p:childTnLst>
+                                </p:cTn>
+                              </p:par>
+                            </p:childTnLst>
+                          </p:cTn>
+                        </p:par>
+                      </p:childTnLst>
+                    </p:cTn>
+                  </p:par>
+                  <p:par>
+                    <p:cTn id="21" fill="hold">
+                      <p:stCondLst>
+                        <p:cond delay="indefinite"/>
+                      </p:stCondLst>
+                      <p:childTnLst>
+                        <p:par>
+                          <p:cTn id="22" fill="hold">
+                            <p:stCondLst>
+                              <p:cond delay="0"/>
+                            </p:stCondLst>
+                            <p:childTnLst>
+                              <p:par>
+                                <p:cTn id="23" presetID="1" presetClass="entr" presetSubtype="0" fill="hold" nodeType="clickEffect">
+                                  <p:stCondLst>
+                                    <p:cond delay="0"/>
+                                  </p:stCondLst>
+                                  <p:childTnLst>
+                                    <p:set>
+                                      <p:cBhvr>
+                                        <p:cTn id="24" dur="1" fill="hold">
+                                          <p:stCondLst>
+                                            <p:cond delay="0"/>
+                                          </p:stCondLst>
+                                        </p:cTn>
+                                        <p:tgtEl>
+                                          <p:spTgt spid="65"/>
+                                        </p:tgtEl>
+                                        <p:attrNameLst>
+                                          <p:attrName>style.visibility</p:attrName>
+                                        </p:attrNameLst>
+                                      </p:cBhvr>
+                                      <p:to>
+                                        <p:strVal val="visible"/>
+                                      </p:to>
+                                    </p:set>
+                                  </p:childTnLst>
+                                </p:cTn>
+                              </p:par>
+                              <p:par>
+                                <p:cTn id="25" presetID="1" presetClass="entr" presetSubtype="0" fill="hold" grpId="0" nodeType="withEffect">
+                                  <p:stCondLst>
+                                    <p:cond delay="0"/>
+                                  </p:stCondLst>
+                                  <p:childTnLst>
+                                    <p:set>
+                                      <p:cBhvr>
+                                        <p:cTn id="26" dur="1" fill="hold">
+                                          <p:stCondLst>
+                                            <p:cond delay="0"/>
+                                          </p:stCondLst>
+                                        </p:cTn>
+                                        <p:tgtEl>
+                                          <p:spTgt spid="97"/>
+                                        </p:tgtEl>
+                                        <p:attrNameLst>
+                                          <p:attrName>style.visibility</p:attrName>
+                                        </p:attrNameLst>
+                                      </p:cBhvr>
+                                      <p:to>
+                                        <p:strVal val="visible"/>
+                                      </p:to>
+                                    </p:set>
+                                  </p:childTnLst>
+                                </p:cTn>
+                              </p:par>
+                              <p:par>
+                                <p:cTn id="27" presetID="1" presetClass="entr" presetSubtype="0" fill="hold" grpId="0" nodeType="withEffect">
+                                  <p:stCondLst>
+                                    <p:cond delay="0"/>
+                                  </p:stCondLst>
+                                  <p:childTnLst>
+                                    <p:set>
+                                      <p:cBhvr>
+                                        <p:cTn id="28" dur="1" fill="hold">
+                                          <p:stCondLst>
+                                            <p:cond delay="0"/>
+                                          </p:stCondLst>
+                                        </p:cTn>
+                                        <p:tgtEl>
+                                          <p:spTgt spid="96"/>
+                                        </p:tgtEl>
+                                        <p:attrNameLst>
+                                          <p:attrName>style.visibility</p:attrName>
+                                        </p:attrNameLst>
+                                      </p:cBhvr>
+                                      <p:to>
+                                        <p:strVal val="visible"/>
+                                      </p:to>
+                                    </p:set>
+                                  </p:childTnLst>
+                                </p:cTn>
+                              </p:par>
+                              <p:par>
+                                <p:cTn id="29" presetID="1" presetClass="entr" presetSubtype="0" fill="hold" grpId="0" nodeType="withEffect">
+                                  <p:stCondLst>
+                                    <p:cond delay="0"/>
+                                  </p:stCondLst>
+                                  <p:childTnLst>
+                                    <p:set>
+                                      <p:cBhvr>
+                                        <p:cTn id="30" dur="1" fill="hold">
+                                          <p:stCondLst>
+                                            <p:cond delay="0"/>
+                                          </p:stCondLst>
+                                        </p:cTn>
+                                        <p:tgtEl>
+                                          <p:spTgt spid="87"/>
+                                        </p:tgtEl>
+                                        <p:attrNameLst>
+                                          <p:attrName>style.visibility</p:attrName>
+                                        </p:attrNameLst>
+                                      </p:cBhvr>
+                                      <p:to>
+                                        <p:strVal val="visible"/>
+                                      </p:to>
+                                    </p:set>
+                                  </p:childTnLst>
+                                </p:cTn>
+                              </p:par>
+                            </p:childTnLst>
+                          </p:cTn>
+                        </p:par>
+                      </p:childTnLst>
+                    </p:cTn>
+                  </p:par>
+                  <p:par>
+                    <p:cTn id="31" fill="hold">
+                      <p:stCondLst>
+                        <p:cond delay="indefinite"/>
+                      </p:stCondLst>
+                      <p:childTnLst>
+                        <p:par>
+                          <p:cTn id="32" fill="hold">
+                            <p:stCondLst>
+                              <p:cond delay="0"/>
+                            </p:stCondLst>
+                            <p:childTnLst>
+                              <p:par>
+                                <p:cTn id="33" presetID="1" presetClass="entr" presetSubtype="0" fill="hold" grpId="0" nodeType="clickEffect">
+                                  <p:stCondLst>
+                                    <p:cond delay="0"/>
+                                  </p:stCondLst>
+                                  <p:childTnLst>
+                                    <p:set>
+                                      <p:cBhvr>
+                                        <p:cTn id="34" dur="1" fill="hold">
+                                          <p:stCondLst>
+                                            <p:cond delay="0"/>
+                                          </p:stCondLst>
+                                        </p:cTn>
+                                        <p:tgtEl>
+                                          <p:spTgt spid="101"/>
+                                        </p:tgtEl>
+                                        <p:attrNameLst>
+                                          <p:attrName>style.visibility</p:attrName>
+                                        </p:attrNameLst>
+                                      </p:cBhvr>
+                                      <p:to>
+                                        <p:strVal val="visible"/>
+                                      </p:to>
+                                    </p:set>
+                                  </p:childTnLst>
+                                </p:cTn>
+                              </p:par>
+                              <p:par>
+                                <p:cTn id="35" presetID="1" presetClass="entr" presetSubtype="0" fill="hold" nodeType="withEffect">
+                                  <p:stCondLst>
+                                    <p:cond delay="0"/>
+                                  </p:stCondLst>
+                                  <p:childTnLst>
+                                    <p:set>
+                                      <p:cBhvr>
+                                        <p:cTn id="36" dur="1" fill="hold">
+                                          <p:stCondLst>
+                                            <p:cond delay="0"/>
+                                          </p:stCondLst>
+                                        </p:cTn>
+                                        <p:tgtEl>
+                                          <p:spTgt spid="100"/>
+                                        </p:tgtEl>
+                                        <p:attrNameLst>
+                                          <p:attrName>style.visibility</p:attrName>
+                                        </p:attrNameLst>
+                                      </p:cBhvr>
+                                      <p:to>
+                                        <p:strVal val="visible"/>
+                                      </p:to>
+                                    </p:set>
+                                  </p:childTnLst>
+                                </p:cTn>
+                              </p:par>
+                              <p:par>
+                                <p:cTn id="37" presetID="1" presetClass="entr" presetSubtype="0" fill="hold" grpId="0" nodeType="withEffect">
+                                  <p:stCondLst>
+                                    <p:cond delay="0"/>
+                                  </p:stCondLst>
+                                  <p:childTnLst>
+                                    <p:set>
+                                      <p:cBhvr>
+                                        <p:cTn id="38" dur="1" fill="hold">
+                                          <p:stCondLst>
+                                            <p:cond delay="0"/>
+                                          </p:stCondLst>
+                                        </p:cTn>
+                                        <p:tgtEl>
+                                          <p:spTgt spid="99"/>
                                         </p:tgtEl>
                                         <p:attrNameLst>
                                           <p:attrName>style.visibility</p:attrName>
@@ -26763,9 +27297,14 @@
     </p:tnLst>
     <p:bldLst>
       <p:bldP spid="66" grpId="0"/>
-      <p:bldP spid="71" grpId="0"/>
       <p:bldP spid="72" grpId="0"/>
       <p:bldP spid="78" grpId="0"/>
+      <p:bldP spid="91" grpId="0"/>
+      <p:bldP spid="101" grpId="0"/>
+      <p:bldP spid="87" grpId="0" animBg="1"/>
+      <p:bldP spid="96" grpId="0"/>
+      <p:bldP spid="97" grpId="0"/>
+      <p:bldP spid="99" grpId="0"/>
     </p:bldLst>
   </p:timing>
 </p:sld>
@@ -27357,7 +27896,7 @@
           <a:p>
             <a:r>
               <a:rPr lang="en-US" dirty="0" smtClean="0"/>
-              <a:t>Validate and Export Design</a:t>
+              <a:t>Verify Design</a:t>
             </a:r>
             <a:endParaRPr lang="en-US" dirty="0"/>
           </a:p>
@@ -27365,7 +27904,7 @@
       </p:sp>
       <p:sp>
         <p:nvSpPr>
-          <p:cNvPr id="4" name="Content Placeholder 3"/>
+          <p:cNvPr id="3" name="Content Placeholder 2"/>
           <p:cNvSpPr>
             <a:spLocks noGrp="1"/>
           </p:cNvSpPr>
@@ -27373,69 +27912,33 @@
             <p:ph idx="1"/>
           </p:nvPr>
         </p:nvSpPr>
-        <p:spPr>
-          <a:xfrm>
-            <a:off x="581736" y="1523052"/>
-            <a:ext cx="8131175" cy="4324350"/>
-          </a:xfrm>
-        </p:spPr>
+        <p:spPr/>
         <p:txBody>
           <a:bodyPr/>
           <a:lstStyle/>
           <a:p>
-            <a:pPr marL="457200" indent="-457200">
-              <a:buFont typeface="+mj-lt"/>
-              <a:buAutoNum type="arabicPeriod"/>
-            </a:pPr>
-            <a:r>
-              <a:rPr lang="en-US" b="0" dirty="0" smtClean="0"/>
-              <a:t>First click validate design_1</a:t>
-            </a:r>
-          </a:p>
-          <a:p>
-            <a:pPr marL="457200" indent="-457200">
-              <a:buFont typeface="+mj-lt"/>
-              <a:buAutoNum type="arabicPeriod"/>
-            </a:pPr>
-            <a:r>
-              <a:rPr lang="en-US" b="0" dirty="0" smtClean="0"/>
-              <a:t>Regenerate the design_1 HDL wrapper. </a:t>
-            </a:r>
-          </a:p>
-          <a:p>
-            <a:pPr marL="457200" indent="-457200">
-              <a:buFont typeface="+mj-lt"/>
-              <a:buAutoNum type="arabicPeriod"/>
-            </a:pPr>
-            <a:r>
-              <a:rPr lang="en-US" b="0" dirty="0" smtClean="0"/>
-              <a:t>Finally you need to generate the Generate Design </a:t>
-            </a:r>
-            <a:r>
-              <a:rPr lang="en-US" b="0" dirty="0" err="1" smtClean="0"/>
-              <a:t>bitstream</a:t>
-            </a:r>
-            <a:r>
-              <a:rPr lang="en-US" b="0" dirty="0" smtClean="0"/>
-              <a:t> </a:t>
-            </a:r>
-          </a:p>
-          <a:p>
-            <a:pPr marL="457200" indent="-457200">
-              <a:buFont typeface="+mj-lt"/>
-              <a:buAutoNum type="arabicPeriod"/>
-            </a:pPr>
-            <a:r>
-              <a:rPr lang="en-US" b="0" dirty="0" smtClean="0"/>
-              <a:t>Take a coffee break while it builds</a:t>
-            </a:r>
-            <a:endParaRPr lang="en-US" b="0" dirty="0"/>
-          </a:p>
-        </p:txBody>
-      </p:sp>
-      <p:sp>
-        <p:nvSpPr>
-          <p:cNvPr id="5" name="Slide Number Placeholder 3"/>
+            <a:r>
+              <a:rPr lang="en-US" dirty="0" smtClean="0"/>
+              <a:t>You should verify the addressing for all your design components before continuing.  </a:t>
+            </a:r>
+          </a:p>
+          <a:p>
+            <a:r>
+              <a:rPr lang="en-US" dirty="0"/>
+              <a:t>Verify that the base addresses are the same addresses used in the template C-code.</a:t>
+            </a:r>
+          </a:p>
+          <a:p>
+            <a:r>
+              <a:rPr lang="en-US" dirty="0" smtClean="0"/>
+              <a:t>Should be no changes at this time. </a:t>
+            </a:r>
+          </a:p>
+        </p:txBody>
+      </p:sp>
+      <p:sp>
+        <p:nvSpPr>
+          <p:cNvPr id="4" name="Slide Number Placeholder 3"/>
           <p:cNvSpPr>
             <a:spLocks noGrp="1"/>
           </p:cNvSpPr>
@@ -27443,12 +27946,7 @@
             <p:ph type="sldNum" sz="quarter" idx="10"/>
           </p:nvPr>
         </p:nvSpPr>
-        <p:spPr>
-          <a:xfrm>
-            <a:off x="6910388" y="6389643"/>
-            <a:ext cx="2133600" cy="476250"/>
-          </a:xfrm>
-        </p:spPr>
+        <p:spPr/>
         <p:txBody>
           <a:bodyPr/>
           <a:lstStyle/>
@@ -27475,10 +27973,429 @@
           </a:p>
         </p:txBody>
       </p:sp>
+      <p:sp>
+        <p:nvSpPr>
+          <p:cNvPr id="5" name="Date Placeholder 4"/>
+          <p:cNvSpPr>
+            <a:spLocks noGrp="1"/>
+          </p:cNvSpPr>
+          <p:nvPr>
+            <p:ph type="dt" sz="half" idx="11"/>
+          </p:nvPr>
+        </p:nvSpPr>
+        <p:spPr/>
+        <p:txBody>
+          <a:bodyPr/>
+          <a:lstStyle/>
+          <a:p>
+            <a:pPr fontAlgn="auto">
+              <a:spcBef>
+                <a:spcPts val="0"/>
+              </a:spcBef>
+              <a:spcAft>
+                <a:spcPts val="0"/>
+              </a:spcAft>
+              <a:defRPr/>
+            </a:pPr>
+            <a:endParaRPr lang="en-US" sz="1800" smtClean="0">
+              <a:solidFill>
+                <a:srgbClr val="000000"/>
+              </a:solidFill>
+            </a:endParaRPr>
+          </a:p>
+          <a:p>
+            <a:pPr fontAlgn="auto">
+              <a:spcBef>
+                <a:spcPts val="0"/>
+              </a:spcBef>
+              <a:spcAft>
+                <a:spcPts val="0"/>
+              </a:spcAft>
+              <a:defRPr/>
+            </a:pPr>
+            <a:fld id="{D957A480-45FD-4E4A-ABAC-1E7EB071E91C}" type="datetime3">
+              <a:rPr lang="en-US" sz="1800" smtClean="0">
+                <a:solidFill>
+                  <a:srgbClr val="000000"/>
+                </a:solidFill>
+              </a:rPr>
+              <a:pPr fontAlgn="auto">
+                <a:spcBef>
+                  <a:spcPts val="0"/>
+                </a:spcBef>
+                <a:spcAft>
+                  <a:spcPts val="0"/>
+                </a:spcAft>
+                <a:defRPr/>
+              </a:pPr>
+              <a:t>23 February 2017</a:t>
+            </a:fld>
+            <a:endParaRPr lang="en-US" sz="1800">
+              <a:solidFill>
+                <a:srgbClr val="000000"/>
+              </a:solidFill>
+            </a:endParaRPr>
+          </a:p>
+        </p:txBody>
+      </p:sp>
+      <p:pic>
+        <p:nvPicPr>
+          <p:cNvPr id="1026" name="Picture 2"/>
+          <p:cNvPicPr>
+            <a:picLocks noChangeAspect="1" noChangeArrowheads="1"/>
+          </p:cNvPicPr>
+          <p:nvPr/>
+        </p:nvPicPr>
+        <p:blipFill>
+          <a:blip r:embed="rId2">
+            <a:extLst>
+              <a:ext uri="{28A0092B-C50C-407E-A947-70E740481C1C}">
+                <a14:useLocalDpi xmlns:a14="http://schemas.microsoft.com/office/drawing/2010/main" val="0"/>
+              </a:ext>
+            </a:extLst>
+          </a:blip>
+          <a:srcRect/>
+          <a:stretch>
+            <a:fillRect/>
+          </a:stretch>
+        </p:blipFill>
+        <p:spPr bwMode="auto">
+          <a:xfrm>
+            <a:off x="762000" y="3781425"/>
+            <a:ext cx="7620000" cy="2095500"/>
+          </a:xfrm>
+          <a:prstGeom prst="rect">
+            <a:avLst/>
+          </a:prstGeom>
+          <a:noFill/>
+          <a:ln>
+            <a:noFill/>
+          </a:ln>
+          <a:extLst>
+            <a:ext uri="{909E8E84-426E-40DD-AFC4-6F175D3DCCD1}">
+              <a14:hiddenFill xmlns:a14="http://schemas.microsoft.com/office/drawing/2010/main">
+                <a:solidFill>
+                  <a:schemeClr val="accent1"/>
+                </a:solidFill>
+              </a14:hiddenFill>
+            </a:ext>
+            <a:ext uri="{91240B29-F687-4F45-9708-019B960494DF}">
+              <a14:hiddenLine xmlns:a14="http://schemas.microsoft.com/office/drawing/2010/main" w="9525">
+                <a:solidFill>
+                  <a:schemeClr val="tx1"/>
+                </a:solidFill>
+                <a:miter lim="800000"/>
+                <a:headEnd/>
+                <a:tailEnd/>
+              </a14:hiddenLine>
+            </a:ext>
+          </a:extLst>
+        </p:spPr>
+      </p:pic>
+      <p:sp>
+        <p:nvSpPr>
+          <p:cNvPr id="7" name="Oval 6"/>
+          <p:cNvSpPr/>
+          <p:nvPr/>
+        </p:nvSpPr>
+        <p:spPr bwMode="auto">
+          <a:xfrm>
+            <a:off x="5380326" y="4532649"/>
+            <a:ext cx="1096735" cy="386658"/>
+          </a:xfrm>
+          <a:prstGeom prst="ellipse">
+            <a:avLst/>
+          </a:prstGeom>
+          <a:noFill/>
+          <a:ln w="25400" cap="flat" cmpd="sng" algn="ctr">
+            <a:solidFill>
+              <a:srgbClr val="002060"/>
+            </a:solidFill>
+            <a:prstDash val="solid"/>
+            <a:round/>
+            <a:headEnd type="none" w="med" len="med"/>
+            <a:tailEnd type="none" w="med" len="med"/>
+          </a:ln>
+          <a:effectLst/>
+        </p:spPr>
+        <p:txBody>
+          <a:bodyPr vert="horz" wrap="square" lIns="91440" tIns="45720" rIns="91440" bIns="45720" numCol="1" rtlCol="0" anchor="b" anchorCtr="0" compatLnSpc="1">
+            <a:prstTxWarp prst="textNoShape">
+              <a:avLst/>
+            </a:prstTxWarp>
+          </a:bodyPr>
+          <a:lstStyle/>
+          <a:p>
+            <a:pPr marL="0" marR="0" indent="0" algn="ctr" defTabSz="914400" rtl="0" eaLnBrk="0" fontAlgn="base" latinLnBrk="0" hangingPunct="0">
+              <a:lnSpc>
+                <a:spcPct val="100000"/>
+              </a:lnSpc>
+              <a:spcBef>
+                <a:spcPct val="0"/>
+              </a:spcBef>
+              <a:spcAft>
+                <a:spcPct val="0"/>
+              </a:spcAft>
+              <a:buClrTx/>
+              <a:buSzTx/>
+              <a:buFontTx/>
+              <a:buNone/>
+              <a:tabLst/>
+            </a:pPr>
+            <a:r>
+              <a:rPr lang="en-US" sz="4400" b="1" dirty="0" smtClean="0">
+                <a:solidFill>
+                  <a:srgbClr val="FF0000"/>
+                </a:solidFill>
+                <a:latin typeface="Arial" charset="0"/>
+              </a:rPr>
+              <a:t>2</a:t>
+            </a:r>
+            <a:endParaRPr kumimoji="0" lang="en-US" sz="4400" b="1" i="0" u="none" strike="noStrike" cap="none" normalizeH="0" baseline="0" dirty="0" smtClean="0">
+              <a:ln>
+                <a:noFill/>
+              </a:ln>
+              <a:solidFill>
+                <a:srgbClr val="FF0000"/>
+              </a:solidFill>
+              <a:effectLst/>
+              <a:latin typeface="Arial" charset="0"/>
+            </a:endParaRPr>
+          </a:p>
+          <a:p>
+            <a:pPr marL="0" marR="0" indent="0" algn="ctr" defTabSz="914400" rtl="0" eaLnBrk="0" fontAlgn="base" latinLnBrk="0" hangingPunct="0">
+              <a:lnSpc>
+                <a:spcPct val="100000"/>
+              </a:lnSpc>
+              <a:spcBef>
+                <a:spcPct val="0"/>
+              </a:spcBef>
+              <a:spcAft>
+                <a:spcPct val="0"/>
+              </a:spcAft>
+              <a:buClrTx/>
+              <a:buSzTx/>
+              <a:buFontTx/>
+              <a:buNone/>
+              <a:tabLst/>
+            </a:pPr>
+            <a:endParaRPr kumimoji="0" lang="en-US" sz="1100" b="1" i="0" u="none" strike="noStrike" cap="none" normalizeH="0" baseline="0" dirty="0" smtClean="0">
+              <a:ln>
+                <a:noFill/>
+              </a:ln>
+              <a:solidFill>
+                <a:srgbClr val="FF0000"/>
+              </a:solidFill>
+              <a:effectLst/>
+              <a:latin typeface="Arial" charset="0"/>
+            </a:endParaRPr>
+          </a:p>
+        </p:txBody>
+      </p:sp>
+      <p:sp>
+        <p:nvSpPr>
+          <p:cNvPr id="8" name="Oval 7"/>
+          <p:cNvSpPr/>
+          <p:nvPr/>
+        </p:nvSpPr>
+        <p:spPr bwMode="auto">
+          <a:xfrm>
+            <a:off x="5408901" y="4976457"/>
+            <a:ext cx="1096735" cy="386658"/>
+          </a:xfrm>
+          <a:prstGeom prst="ellipse">
+            <a:avLst/>
+          </a:prstGeom>
+          <a:noFill/>
+          <a:ln w="25400" cap="flat" cmpd="sng" algn="ctr">
+            <a:solidFill>
+              <a:srgbClr val="002060"/>
+            </a:solidFill>
+            <a:prstDash val="solid"/>
+            <a:round/>
+            <a:headEnd type="none" w="med" len="med"/>
+            <a:tailEnd type="none" w="med" len="med"/>
+          </a:ln>
+          <a:effectLst/>
+        </p:spPr>
+        <p:txBody>
+          <a:bodyPr vert="horz" wrap="square" lIns="91440" tIns="45720" rIns="91440" bIns="45720" numCol="1" rtlCol="0" anchor="b" anchorCtr="0" compatLnSpc="1">
+            <a:prstTxWarp prst="textNoShape">
+              <a:avLst/>
+            </a:prstTxWarp>
+          </a:bodyPr>
+          <a:lstStyle/>
+          <a:p>
+            <a:pPr marL="0" marR="0" indent="0" algn="ctr" defTabSz="914400" rtl="0" eaLnBrk="0" fontAlgn="base" latinLnBrk="0" hangingPunct="0">
+              <a:lnSpc>
+                <a:spcPct val="100000"/>
+              </a:lnSpc>
+              <a:spcBef>
+                <a:spcPct val="0"/>
+              </a:spcBef>
+              <a:spcAft>
+                <a:spcPct val="0"/>
+              </a:spcAft>
+              <a:buClrTx/>
+              <a:buSzTx/>
+              <a:buFontTx/>
+              <a:buNone/>
+              <a:tabLst/>
+            </a:pPr>
+            <a:r>
+              <a:rPr lang="en-US" sz="4400" b="1" dirty="0" smtClean="0">
+                <a:solidFill>
+                  <a:srgbClr val="FF0000"/>
+                </a:solidFill>
+                <a:latin typeface="Arial" charset="0"/>
+              </a:rPr>
+              <a:t>3</a:t>
+            </a:r>
+            <a:endParaRPr kumimoji="0" lang="en-US" sz="4400" b="1" i="0" u="none" strike="noStrike" cap="none" normalizeH="0" baseline="0" dirty="0" smtClean="0">
+              <a:ln>
+                <a:noFill/>
+              </a:ln>
+              <a:solidFill>
+                <a:srgbClr val="FF0000"/>
+              </a:solidFill>
+              <a:effectLst/>
+              <a:latin typeface="Arial" charset="0"/>
+            </a:endParaRPr>
+          </a:p>
+          <a:p>
+            <a:pPr marL="0" marR="0" indent="0" algn="ctr" defTabSz="914400" rtl="0" eaLnBrk="0" fontAlgn="base" latinLnBrk="0" hangingPunct="0">
+              <a:lnSpc>
+                <a:spcPct val="100000"/>
+              </a:lnSpc>
+              <a:spcBef>
+                <a:spcPct val="0"/>
+              </a:spcBef>
+              <a:spcAft>
+                <a:spcPct val="0"/>
+              </a:spcAft>
+              <a:buClrTx/>
+              <a:buSzTx/>
+              <a:buFontTx/>
+              <a:buNone/>
+              <a:tabLst/>
+            </a:pPr>
+            <a:endParaRPr kumimoji="0" lang="en-US" sz="1100" b="1" i="0" u="none" strike="noStrike" cap="none" normalizeH="0" baseline="0" dirty="0" smtClean="0">
+              <a:ln>
+                <a:noFill/>
+              </a:ln>
+              <a:solidFill>
+                <a:srgbClr val="FF0000"/>
+              </a:solidFill>
+              <a:effectLst/>
+              <a:latin typeface="Arial" charset="0"/>
+            </a:endParaRPr>
+          </a:p>
+        </p:txBody>
+      </p:sp>
+      <p:sp>
+        <p:nvSpPr>
+          <p:cNvPr id="9" name="Oval 8"/>
+          <p:cNvSpPr/>
+          <p:nvPr/>
+        </p:nvSpPr>
+        <p:spPr bwMode="auto">
+          <a:xfrm>
+            <a:off x="1703676" y="3781425"/>
+            <a:ext cx="1220499" cy="386658"/>
+          </a:xfrm>
+          <a:prstGeom prst="ellipse">
+            <a:avLst/>
+          </a:prstGeom>
+          <a:noFill/>
+          <a:ln w="25400" cap="flat" cmpd="sng" algn="ctr">
+            <a:solidFill>
+              <a:srgbClr val="002060"/>
+            </a:solidFill>
+            <a:prstDash val="solid"/>
+            <a:round/>
+            <a:headEnd type="none" w="med" len="med"/>
+            <a:tailEnd type="none" w="med" len="med"/>
+          </a:ln>
+          <a:effectLst/>
+        </p:spPr>
+        <p:txBody>
+          <a:bodyPr vert="horz" wrap="square" lIns="91440" tIns="45720" rIns="91440" bIns="45720" numCol="1" rtlCol="0" anchor="b" anchorCtr="0" compatLnSpc="1">
+            <a:prstTxWarp prst="textNoShape">
+              <a:avLst/>
+            </a:prstTxWarp>
+          </a:bodyPr>
+          <a:lstStyle/>
+          <a:p>
+            <a:pPr marL="0" marR="0" indent="0" algn="ctr" defTabSz="914400" rtl="0" eaLnBrk="0" fontAlgn="base" latinLnBrk="0" hangingPunct="0">
+              <a:lnSpc>
+                <a:spcPct val="100000"/>
+              </a:lnSpc>
+              <a:spcBef>
+                <a:spcPct val="0"/>
+              </a:spcBef>
+              <a:spcAft>
+                <a:spcPct val="0"/>
+              </a:spcAft>
+              <a:buClrTx/>
+              <a:buSzTx/>
+              <a:buFontTx/>
+              <a:buNone/>
+              <a:tabLst/>
+            </a:pPr>
+            <a:r>
+              <a:rPr lang="en-US" sz="4400" b="1" dirty="0" smtClean="0">
+                <a:solidFill>
+                  <a:srgbClr val="FF0000"/>
+                </a:solidFill>
+                <a:latin typeface="Arial" charset="0"/>
+              </a:rPr>
+              <a:t>1</a:t>
+            </a:r>
+            <a:endParaRPr kumimoji="0" lang="en-US" sz="4400" b="1" i="0" u="none" strike="noStrike" cap="none" normalizeH="0" baseline="0" dirty="0" smtClean="0">
+              <a:ln>
+                <a:noFill/>
+              </a:ln>
+              <a:solidFill>
+                <a:srgbClr val="FF0000"/>
+              </a:solidFill>
+              <a:effectLst/>
+              <a:latin typeface="Arial" charset="0"/>
+            </a:endParaRPr>
+          </a:p>
+          <a:p>
+            <a:pPr marL="0" marR="0" indent="0" algn="ctr" defTabSz="914400" rtl="0" eaLnBrk="0" fontAlgn="base" latinLnBrk="0" hangingPunct="0">
+              <a:lnSpc>
+                <a:spcPct val="100000"/>
+              </a:lnSpc>
+              <a:spcBef>
+                <a:spcPct val="0"/>
+              </a:spcBef>
+              <a:spcAft>
+                <a:spcPct val="0"/>
+              </a:spcAft>
+              <a:buClrTx/>
+              <a:buSzTx/>
+              <a:buFontTx/>
+              <a:buNone/>
+              <a:tabLst/>
+            </a:pPr>
+            <a:endParaRPr kumimoji="0" lang="en-US" sz="1100" b="1" i="0" u="none" strike="noStrike" cap="none" normalizeH="0" baseline="0" dirty="0" smtClean="0">
+              <a:ln>
+                <a:noFill/>
+              </a:ln>
+              <a:solidFill>
+                <a:srgbClr val="FF0000"/>
+              </a:solidFill>
+              <a:effectLst/>
+              <a:latin typeface="Arial" charset="0"/>
+            </a:endParaRPr>
+          </a:p>
+        </p:txBody>
+      </p:sp>
     </p:spTree>
     <p:extLst>
       <p:ext uri="{BB962C8B-B14F-4D97-AF65-F5344CB8AC3E}">
-        <p14:creationId xmlns:p14="http://schemas.microsoft.com/office/powerpoint/2010/main" val="1331824036"/>
+        <p14:creationId xmlns:p14="http://schemas.microsoft.com/office/powerpoint/2010/main" val="1786435410"/>
       </p:ext>
     </p:extLst>
   </p:cSld>
@@ -27488,9 +28405,172 @@
   <p:timing>
     <p:tnLst>
       <p:par>
-        <p:cTn id="1" dur="indefinite" restart="never" nodeType="tmRoot"/>
+        <p:cTn id="1" dur="indefinite" restart="never" nodeType="tmRoot">
+          <p:childTnLst>
+            <p:seq concurrent="1" nextAc="seek">
+              <p:cTn id="2" dur="indefinite" nodeType="mainSeq">
+                <p:childTnLst>
+                  <p:par>
+                    <p:cTn id="3" fill="hold">
+                      <p:stCondLst>
+                        <p:cond delay="indefinite"/>
+                      </p:stCondLst>
+                      <p:childTnLst>
+                        <p:par>
+                          <p:cTn id="4" fill="hold">
+                            <p:stCondLst>
+                              <p:cond delay="0"/>
+                            </p:stCondLst>
+                            <p:childTnLst>
+                              <p:par>
+                                <p:cTn id="5" presetID="1" presetClass="entr" presetSubtype="0" fill="hold" grpId="0" nodeType="clickEffect">
+                                  <p:stCondLst>
+                                    <p:cond delay="0"/>
+                                  </p:stCondLst>
+                                  <p:childTnLst>
+                                    <p:set>
+                                      <p:cBhvr>
+                                        <p:cTn id="6" dur="1" fill="hold">
+                                          <p:stCondLst>
+                                            <p:cond delay="0"/>
+                                          </p:stCondLst>
+                                        </p:cTn>
+                                        <p:tgtEl>
+                                          <p:spTgt spid="9"/>
+                                        </p:tgtEl>
+                                        <p:attrNameLst>
+                                          <p:attrName>style.visibility</p:attrName>
+                                        </p:attrNameLst>
+                                      </p:cBhvr>
+                                      <p:to>
+                                        <p:strVal val="visible"/>
+                                      </p:to>
+                                    </p:set>
+                                  </p:childTnLst>
+                                </p:cTn>
+                              </p:par>
+                            </p:childTnLst>
+                          </p:cTn>
+                        </p:par>
+                      </p:childTnLst>
+                    </p:cTn>
+                  </p:par>
+                  <p:par>
+                    <p:cTn id="7" fill="hold">
+                      <p:stCondLst>
+                        <p:cond delay="indefinite"/>
+                      </p:stCondLst>
+                      <p:childTnLst>
+                        <p:par>
+                          <p:cTn id="8" fill="hold">
+                            <p:stCondLst>
+                              <p:cond delay="0"/>
+                            </p:stCondLst>
+                            <p:childTnLst>
+                              <p:par>
+                                <p:cTn id="9" presetID="1" presetClass="entr" presetSubtype="0" fill="hold" grpId="0" nodeType="clickEffect">
+                                  <p:stCondLst>
+                                    <p:cond delay="0"/>
+                                  </p:stCondLst>
+                                  <p:childTnLst>
+                                    <p:set>
+                                      <p:cBhvr>
+                                        <p:cTn id="10" dur="1" fill="hold">
+                                          <p:stCondLst>
+                                            <p:cond delay="0"/>
+                                          </p:stCondLst>
+                                        </p:cTn>
+                                        <p:tgtEl>
+                                          <p:spTgt spid="7"/>
+                                        </p:tgtEl>
+                                        <p:attrNameLst>
+                                          <p:attrName>style.visibility</p:attrName>
+                                        </p:attrNameLst>
+                                      </p:cBhvr>
+                                      <p:to>
+                                        <p:strVal val="visible"/>
+                                      </p:to>
+                                    </p:set>
+                                  </p:childTnLst>
+                                </p:cTn>
+                              </p:par>
+                            </p:childTnLst>
+                          </p:cTn>
+                        </p:par>
+                      </p:childTnLst>
+                    </p:cTn>
+                  </p:par>
+                  <p:par>
+                    <p:cTn id="11" fill="hold">
+                      <p:stCondLst>
+                        <p:cond delay="indefinite"/>
+                      </p:stCondLst>
+                      <p:childTnLst>
+                        <p:par>
+                          <p:cTn id="12" fill="hold">
+                            <p:stCondLst>
+                              <p:cond delay="0"/>
+                            </p:stCondLst>
+                            <p:childTnLst>
+                              <p:par>
+                                <p:cTn id="13" presetID="1" presetClass="entr" presetSubtype="0" fill="hold" grpId="0" nodeType="clickEffect">
+                                  <p:stCondLst>
+                                    <p:cond delay="0"/>
+                                  </p:stCondLst>
+                                  <p:childTnLst>
+                                    <p:set>
+                                      <p:cBhvr>
+                                        <p:cTn id="14" dur="1" fill="hold">
+                                          <p:stCondLst>
+                                            <p:cond delay="0"/>
+                                          </p:stCondLst>
+                                        </p:cTn>
+                                        <p:tgtEl>
+                                          <p:spTgt spid="8"/>
+                                        </p:tgtEl>
+                                        <p:attrNameLst>
+                                          <p:attrName>style.visibility</p:attrName>
+                                        </p:attrNameLst>
+                                      </p:cBhvr>
+                                      <p:to>
+                                        <p:strVal val="visible"/>
+                                      </p:to>
+                                    </p:set>
+                                  </p:childTnLst>
+                                </p:cTn>
+                              </p:par>
+                            </p:childTnLst>
+                          </p:cTn>
+                        </p:par>
+                      </p:childTnLst>
+                    </p:cTn>
+                  </p:par>
+                </p:childTnLst>
+              </p:cTn>
+              <p:prevCondLst>
+                <p:cond evt="onPrev" delay="0">
+                  <p:tgtEl>
+                    <p:sldTgt/>
+                  </p:tgtEl>
+                </p:cond>
+              </p:prevCondLst>
+              <p:nextCondLst>
+                <p:cond evt="onNext" delay="0">
+                  <p:tgtEl>
+                    <p:sldTgt/>
+                  </p:tgtEl>
+                </p:cond>
+              </p:nextCondLst>
+            </p:seq>
+          </p:childTnLst>
+        </p:cTn>
       </p:par>
     </p:tnLst>
+    <p:bldLst>
+      <p:bldP spid="7" grpId="0" animBg="1"/>
+      <p:bldP spid="8" grpId="0" animBg="1"/>
+      <p:bldP spid="9" grpId="0" animBg="1"/>
+    </p:bldLst>
   </p:timing>
 </p:sld>
 </file>
@@ -27529,7 +28609,7 @@
           <a:p>
             <a:r>
               <a:rPr lang="en-US" dirty="0" smtClean="0"/>
-              <a:t>Export Design</a:t>
+              <a:t>Validate and Export Design</a:t>
             </a:r>
             <a:endParaRPr lang="en-US" dirty="0"/>
           </a:p>
@@ -27555,13 +28635,33 @@
           <a:bodyPr/>
           <a:lstStyle/>
           <a:p>
-            <a:r>
-              <a:rPr lang="en-US" b="0" dirty="0"/>
-              <a:t>Exporting Hardware Design to </a:t>
-            </a:r>
+            <a:pPr marL="457200" indent="-457200">
+              <a:buFont typeface="+mj-lt"/>
+              <a:buAutoNum type="arabicPeriod"/>
+            </a:pPr>
             <a:r>
               <a:rPr lang="en-US" b="0" dirty="0" smtClean="0"/>
-              <a:t>SDK…be sure to include the </a:t>
+              <a:t>First click validate design_1</a:t>
+            </a:r>
+          </a:p>
+          <a:p>
+            <a:pPr marL="457200" indent="-457200">
+              <a:buFont typeface="+mj-lt"/>
+              <a:buAutoNum type="arabicPeriod"/>
+            </a:pPr>
+            <a:r>
+              <a:rPr lang="en-US" b="0" dirty="0" smtClean="0"/>
+              <a:t>Regenerate the design_1 HDL wrapper. </a:t>
+            </a:r>
+          </a:p>
+          <a:p>
+            <a:pPr marL="457200" indent="-457200">
+              <a:buFont typeface="+mj-lt"/>
+              <a:buAutoNum type="arabicPeriod"/>
+            </a:pPr>
+            <a:r>
+              <a:rPr lang="en-US" b="0" dirty="0" smtClean="0"/>
+              <a:t>Finally you need to generate the Generate Design </a:t>
             </a:r>
             <a:r>
               <a:rPr lang="en-US" b="0" dirty="0" err="1" smtClean="0"/>
@@ -27569,7 +28669,17 @@
             </a:r>
             <a:r>
               <a:rPr lang="en-US" b="0" dirty="0" smtClean="0"/>
-              <a:t>…assuming no errors</a:t>
+              <a:t> </a:t>
+            </a:r>
+          </a:p>
+          <a:p>
+            <a:pPr marL="457200" indent="-457200">
+              <a:buFont typeface="+mj-lt"/>
+              <a:buAutoNum type="arabicPeriod"/>
+            </a:pPr>
+            <a:r>
+              <a:rPr lang="en-US" b="0" dirty="0" smtClean="0"/>
+              <a:t>Take a coffee break while it builds</a:t>
             </a:r>
             <a:endParaRPr lang="en-US" b="0" dirty="0"/>
           </a:p>
@@ -27587,7 +28697,7 @@
         </p:nvSpPr>
         <p:spPr>
           <a:xfrm>
-            <a:off x="6910388" y="6375995"/>
+            <a:off x="6910388" y="6389643"/>
             <a:ext cx="2133600" cy="476250"/>
           </a:xfrm>
         </p:spPr>
@@ -27617,51 +28727,10 @@
           </a:p>
         </p:txBody>
       </p:sp>
-      <p:pic>
-        <p:nvPicPr>
-          <p:cNvPr id="2050" name="Picture 2" descr="https://reference.digilentinc.com/_media/vivado/mig_43.jpg"/>
-          <p:cNvPicPr>
-            <a:picLocks noChangeAspect="1" noChangeArrowheads="1"/>
-          </p:cNvPicPr>
-          <p:nvPr/>
-        </p:nvPicPr>
-        <p:blipFill>
-          <a:blip r:embed="rId2">
-            <a:extLst>
-              <a:ext uri="{28A0092B-C50C-407E-A947-70E740481C1C}">
-                <a14:useLocalDpi xmlns:a14="http://schemas.microsoft.com/office/drawing/2010/main" val="0"/>
-              </a:ext>
-            </a:extLst>
-          </a:blip>
-          <a:srcRect/>
-          <a:stretch>
-            <a:fillRect/>
-          </a:stretch>
-        </p:blipFill>
-        <p:spPr bwMode="auto">
-          <a:xfrm>
-            <a:off x="748735" y="2327535"/>
-            <a:ext cx="7668575" cy="4086913"/>
-          </a:xfrm>
-          <a:prstGeom prst="rect">
-            <a:avLst/>
-          </a:prstGeom>
-          <a:noFill/>
-          <a:extLst>
-            <a:ext uri="{909E8E84-426E-40DD-AFC4-6F175D3DCCD1}">
-              <a14:hiddenFill xmlns:a14="http://schemas.microsoft.com/office/drawing/2010/main">
-                <a:solidFill>
-                  <a:srgbClr val="FFFFFF"/>
-                </a:solidFill>
-              </a14:hiddenFill>
-            </a:ext>
-          </a:extLst>
-        </p:spPr>
-      </p:pic>
     </p:spTree>
     <p:extLst>
       <p:ext uri="{BB962C8B-B14F-4D97-AF65-F5344CB8AC3E}">
-        <p14:creationId xmlns:p14="http://schemas.microsoft.com/office/powerpoint/2010/main" val="3745213582"/>
+        <p14:creationId xmlns:p14="http://schemas.microsoft.com/office/powerpoint/2010/main" val="1331824036"/>
       </p:ext>
     </p:extLst>
   </p:cSld>
@@ -27712,7 +28781,7 @@
           <a:p>
             <a:r>
               <a:rPr lang="en-US" dirty="0" smtClean="0"/>
-              <a:t>Launch SDK</a:t>
+              <a:t>Export Design</a:t>
             </a:r>
             <a:endParaRPr lang="en-US" dirty="0"/>
           </a:p>
@@ -27740,32 +28809,21 @@
           <a:p>
             <a:r>
               <a:rPr lang="en-US" b="0" dirty="0"/>
-              <a:t>Go to </a:t>
-            </a:r>
-            <a:r>
-              <a:rPr lang="en-US" dirty="0"/>
-              <a:t>File</a:t>
-            </a:r>
-            <a:r>
-              <a:rPr lang="en-US" b="0" dirty="0"/>
-              <a:t> and select </a:t>
-            </a:r>
-            <a:r>
-              <a:rPr lang="en-US" dirty="0"/>
-              <a:t>Launch SDK</a:t>
-            </a:r>
-            <a:r>
-              <a:rPr lang="en-US" b="0" dirty="0"/>
-              <a:t> and click </a:t>
-            </a:r>
-            <a:r>
-              <a:rPr lang="en-US" dirty="0"/>
-              <a:t>OK</a:t>
-            </a:r>
-            <a:r>
-              <a:rPr lang="en-US" b="0" dirty="0"/>
-              <a:t>. </a:t>
-            </a:r>
+              <a:t>Exporting Hardware Design to </a:t>
+            </a:r>
+            <a:r>
+              <a:rPr lang="en-US" b="0" dirty="0" smtClean="0"/>
+              <a:t>SDK…be sure to include the </a:t>
+            </a:r>
+            <a:r>
+              <a:rPr lang="en-US" b="0" dirty="0" err="1" smtClean="0"/>
+              <a:t>bitstream</a:t>
+            </a:r>
+            <a:r>
+              <a:rPr lang="en-US" b="0" dirty="0" smtClean="0"/>
+              <a:t>…assuming no errors</a:t>
+            </a:r>
+            <a:endParaRPr lang="en-US" b="0" dirty="0"/>
           </a:p>
         </p:txBody>
       </p:sp>
@@ -27813,14 +28871,14 @@
       </p:sp>
       <p:pic>
         <p:nvPicPr>
-          <p:cNvPr id="3074" name="Picture 2" descr="https://reference.digilentinc.com/_media/vivado/mig_45.jpg"/>
+          <p:cNvPr id="2050" name="Picture 2" descr="https://reference.digilentinc.com/_media/vivado/mig_43.jpg"/>
           <p:cNvPicPr>
             <a:picLocks noChangeAspect="1" noChangeArrowheads="1"/>
           </p:cNvPicPr>
           <p:nvPr/>
         </p:nvPicPr>
         <p:blipFill>
-          <a:blip r:embed="rId2" cstate="print">
+          <a:blip r:embed="rId2">
             <a:extLst>
               <a:ext uri="{28A0092B-C50C-407E-A947-70E740481C1C}">
                 <a14:useLocalDpi xmlns:a14="http://schemas.microsoft.com/office/drawing/2010/main" val="0"/>
@@ -27834,8 +28892,8 @@
         </p:blipFill>
         <p:spPr bwMode="auto">
           <a:xfrm>
-            <a:off x="871548" y="1904969"/>
-            <a:ext cx="7467240" cy="4523126"/>
+            <a:off x="748735" y="2327535"/>
+            <a:ext cx="7668575" cy="4086913"/>
           </a:xfrm>
           <a:prstGeom prst="rect">
             <a:avLst/>
@@ -27855,7 +28913,7 @@
     </p:spTree>
     <p:extLst>
       <p:ext uri="{BB962C8B-B14F-4D97-AF65-F5344CB8AC3E}">
-        <p14:creationId xmlns:p14="http://schemas.microsoft.com/office/powerpoint/2010/main" val="3524862267"/>
+        <p14:creationId xmlns:p14="http://schemas.microsoft.com/office/powerpoint/2010/main" val="3745213582"/>
       </p:ext>
     </p:extLst>
   </p:cSld>
@@ -27906,7 +28964,7 @@
           <a:p>
             <a:r>
               <a:rPr lang="en-US" dirty="0" smtClean="0"/>
-              <a:t>New SDK Project</a:t>
+              <a:t>Launch SDK</a:t>
             </a:r>
             <a:endParaRPr lang="en-US" dirty="0"/>
           </a:p>
@@ -27932,7 +28990,34 @@
           <a:bodyPr/>
           <a:lstStyle/>
           <a:p>
-            <a:endParaRPr lang="en-US" b="0" dirty="0"/>
+            <a:r>
+              <a:rPr lang="en-US" b="0" dirty="0"/>
+              <a:t>Go to </a:t>
+            </a:r>
+            <a:r>
+              <a:rPr lang="en-US" dirty="0"/>
+              <a:t>File</a:t>
+            </a:r>
+            <a:r>
+              <a:rPr lang="en-US" b="0" dirty="0"/>
+              <a:t> and select </a:t>
+            </a:r>
+            <a:r>
+              <a:rPr lang="en-US" dirty="0"/>
+              <a:t>Launch SDK</a:t>
+            </a:r>
+            <a:r>
+              <a:rPr lang="en-US" b="0" dirty="0"/>
+              <a:t> and click </a:t>
+            </a:r>
+            <a:r>
+              <a:rPr lang="en-US" dirty="0"/>
+              <a:t>OK</a:t>
+            </a:r>
+            <a:r>
+              <a:rPr lang="en-US" b="0" dirty="0"/>
+              <a:t>. </a:t>
+            </a:r>
           </a:p>
         </p:txBody>
       </p:sp>
@@ -27948,7 +29033,7 @@
         </p:nvSpPr>
         <p:spPr>
           <a:xfrm>
-            <a:off x="6924036" y="6381750"/>
+            <a:off x="6910388" y="6375995"/>
             <a:ext cx="2133600" cy="476250"/>
           </a:xfrm>
         </p:spPr>
@@ -27980,14 +29065,14 @@
       </p:sp>
       <p:pic>
         <p:nvPicPr>
-          <p:cNvPr id="6146" name="Picture 2"/>
+          <p:cNvPr id="3074" name="Picture 2" descr="https://reference.digilentinc.com/_media/vivado/mig_45.jpg"/>
           <p:cNvPicPr>
             <a:picLocks noChangeAspect="1" noChangeArrowheads="1"/>
           </p:cNvPicPr>
           <p:nvPr/>
         </p:nvPicPr>
         <p:blipFill>
-          <a:blip r:embed="rId2">
+          <a:blip r:embed="rId2" cstate="print">
             <a:extLst>
               <a:ext uri="{28A0092B-C50C-407E-A947-70E740481C1C}">
                 <a14:useLocalDpi xmlns:a14="http://schemas.microsoft.com/office/drawing/2010/main" val="0"/>
@@ -28001,33 +29086,20 @@
         </p:blipFill>
         <p:spPr bwMode="auto">
           <a:xfrm>
-            <a:off x="2071688" y="1028700"/>
-            <a:ext cx="5000625" cy="5829300"/>
+            <a:off x="871548" y="1904969"/>
+            <a:ext cx="7467240" cy="4523126"/>
           </a:xfrm>
           <a:prstGeom prst="rect">
             <a:avLst/>
           </a:prstGeom>
           <a:noFill/>
-          <a:ln>
-            <a:noFill/>
-          </a:ln>
           <a:extLst>
             <a:ext uri="{909E8E84-426E-40DD-AFC4-6F175D3DCCD1}">
               <a14:hiddenFill xmlns:a14="http://schemas.microsoft.com/office/drawing/2010/main">
                 <a:solidFill>
-                  <a:schemeClr val="accent1"/>
+                  <a:srgbClr val="FFFFFF"/>
                 </a:solidFill>
               </a14:hiddenFill>
-            </a:ext>
-            <a:ext uri="{91240B29-F687-4F45-9708-019B960494DF}">
-              <a14:hiddenLine xmlns:a14="http://schemas.microsoft.com/office/drawing/2010/main" w="9525">
-                <a:solidFill>
-                  <a:schemeClr val="tx1"/>
-                </a:solidFill>
-                <a:miter lim="800000"/>
-                <a:headEnd/>
-                <a:tailEnd/>
-              </a14:hiddenLine>
             </a:ext>
           </a:extLst>
         </p:spPr>
@@ -28035,7 +29107,7 @@
     </p:spTree>
     <p:extLst>
       <p:ext uri="{BB962C8B-B14F-4D97-AF65-F5344CB8AC3E}">
-        <p14:creationId xmlns:p14="http://schemas.microsoft.com/office/powerpoint/2010/main" val="977074750"/>
+        <p14:creationId xmlns:p14="http://schemas.microsoft.com/office/powerpoint/2010/main" val="3524862267"/>
       </p:ext>
     </p:extLst>
   </p:cSld>
@@ -28116,9 +29188,51 @@
           </a:p>
         </p:txBody>
       </p:sp>
+      <p:sp>
+        <p:nvSpPr>
+          <p:cNvPr id="5" name="Slide Number Placeholder 3"/>
+          <p:cNvSpPr>
+            <a:spLocks noGrp="1"/>
+          </p:cNvSpPr>
+          <p:nvPr>
+            <p:ph type="sldNum" sz="quarter" idx="10"/>
+          </p:nvPr>
+        </p:nvSpPr>
+        <p:spPr>
+          <a:xfrm>
+            <a:off x="6924036" y="6381750"/>
+            <a:ext cx="2133600" cy="476250"/>
+          </a:xfrm>
+        </p:spPr>
+        <p:txBody>
+          <a:bodyPr/>
+          <a:lstStyle/>
+          <a:p>
+            <a:pPr>
+              <a:defRPr/>
+            </a:pPr>
+            <a:fld id="{62D6D4B2-7611-498F-8780-1EDC26277454}" type="slidenum">
+              <a:rPr lang="en-US" smtClean="0">
+                <a:solidFill>
+                  <a:srgbClr val="000000"/>
+                </a:solidFill>
+              </a:rPr>
+              <a:pPr>
+                <a:defRPr/>
+              </a:pPr>
+              <a:t>55</a:t>
+            </a:fld>
+            <a:endParaRPr lang="en-US" dirty="0">
+              <a:solidFill>
+                <a:srgbClr val="000000"/>
+              </a:solidFill>
+            </a:endParaRPr>
+          </a:p>
+        </p:txBody>
+      </p:sp>
       <p:pic>
         <p:nvPicPr>
-          <p:cNvPr id="7170" name="Picture 2"/>
+          <p:cNvPr id="6146" name="Picture 2"/>
           <p:cNvPicPr>
             <a:picLocks noChangeAspect="1" noChangeArrowheads="1"/>
           </p:cNvPicPr>
@@ -28139,8 +29253,8 @@
         </p:blipFill>
         <p:spPr bwMode="auto">
           <a:xfrm>
-            <a:off x="2066925" y="1019175"/>
-            <a:ext cx="5010150" cy="5838825"/>
+            <a:off x="2071688" y="1028700"/>
+            <a:ext cx="5000625" cy="5829300"/>
           </a:xfrm>
           <a:prstGeom prst="rect">
             <a:avLst/>
@@ -28170,52 +29284,10 @@
           </a:extLst>
         </p:spPr>
       </p:pic>
-      <p:sp>
-        <p:nvSpPr>
-          <p:cNvPr id="7" name="Slide Number Placeholder 3"/>
-          <p:cNvSpPr>
-            <a:spLocks noGrp="1"/>
-          </p:cNvSpPr>
-          <p:nvPr>
-            <p:ph type="sldNum" sz="quarter" idx="10"/>
-          </p:nvPr>
-        </p:nvSpPr>
-        <p:spPr>
-          <a:xfrm>
-            <a:off x="6910388" y="6381750"/>
-            <a:ext cx="2133600" cy="476250"/>
-          </a:xfrm>
-        </p:spPr>
-        <p:txBody>
-          <a:bodyPr/>
-          <a:lstStyle/>
-          <a:p>
-            <a:pPr>
-              <a:defRPr/>
-            </a:pPr>
-            <a:fld id="{62D6D4B2-7611-498F-8780-1EDC26277454}" type="slidenum">
-              <a:rPr lang="en-US" smtClean="0">
-                <a:solidFill>
-                  <a:srgbClr val="000000"/>
-                </a:solidFill>
-              </a:rPr>
-              <a:pPr>
-                <a:defRPr/>
-              </a:pPr>
-              <a:t>55</a:t>
-            </a:fld>
-            <a:endParaRPr lang="en-US" dirty="0">
-              <a:solidFill>
-                <a:srgbClr val="000000"/>
-              </a:solidFill>
-            </a:endParaRPr>
-          </a:p>
-        </p:txBody>
-      </p:sp>
     </p:spTree>
     <p:extLst>
       <p:ext uri="{BB962C8B-B14F-4D97-AF65-F5344CB8AC3E}">
-        <p14:creationId xmlns:p14="http://schemas.microsoft.com/office/powerpoint/2010/main" val="1294665769"/>
+        <p14:creationId xmlns:p14="http://schemas.microsoft.com/office/powerpoint/2010/main" val="977074750"/>
       </p:ext>
     </p:extLst>
   </p:cSld>
@@ -28266,7 +29338,7 @@
           <a:p>
             <a:r>
               <a:rPr lang="en-US" dirty="0" smtClean="0"/>
-              <a:t>New C Source File</a:t>
+              <a:t>New SDK Project</a:t>
             </a:r>
             <a:endParaRPr lang="en-US" dirty="0"/>
           </a:p>
@@ -28298,13 +29370,13 @@
       </p:sp>
       <p:pic>
         <p:nvPicPr>
-          <p:cNvPr id="8194" name="Picture 2"/>
+          <p:cNvPr id="7170" name="Picture 2"/>
           <p:cNvPicPr>
             <a:picLocks noChangeAspect="1" noChangeArrowheads="1"/>
           </p:cNvPicPr>
           <p:nvPr/>
         </p:nvPicPr>
-        <p:blipFill rotWithShape="1">
+        <p:blipFill>
           <a:blip r:embed="rId2">
             <a:extLst>
               <a:ext uri="{28A0092B-C50C-407E-A947-70E740481C1C}">
@@ -28312,13 +29384,15 @@
               </a:ext>
             </a:extLst>
           </a:blip>
-          <a:srcRect r="55134" b="59850"/>
-          <a:stretch/>
+          <a:srcRect/>
+          <a:stretch>
+            <a:fillRect/>
+          </a:stretch>
         </p:blipFill>
         <p:spPr bwMode="auto">
           <a:xfrm>
-            <a:off x="286603" y="1460943"/>
-            <a:ext cx="8597470" cy="4325708"/>
+            <a:off x="2066925" y="1019175"/>
+            <a:ext cx="5010150" cy="5838825"/>
           </a:xfrm>
           <a:prstGeom prst="rect">
             <a:avLst/>
@@ -28350,7 +29424,7 @@
       </p:pic>
       <p:sp>
         <p:nvSpPr>
-          <p:cNvPr id="6" name="Slide Number Placeholder 3"/>
+          <p:cNvPr id="7" name="Slide Number Placeholder 3"/>
           <p:cNvSpPr>
             <a:spLocks noGrp="1"/>
           </p:cNvSpPr>
@@ -28390,10 +29464,103 @@
           </a:p>
         </p:txBody>
       </p:sp>
+      <p:sp>
+        <p:nvSpPr>
+          <p:cNvPr id="8" name="Oval 7"/>
+          <p:cNvSpPr/>
+          <p:nvPr/>
+        </p:nvSpPr>
+        <p:spPr bwMode="auto">
+          <a:xfrm>
+            <a:off x="2066925" y="2266950"/>
+            <a:ext cx="1220499" cy="386658"/>
+          </a:xfrm>
+          <a:prstGeom prst="ellipse">
+            <a:avLst/>
+          </a:prstGeom>
+          <a:noFill/>
+          <a:ln w="25400" cap="flat" cmpd="sng" algn="ctr">
+            <a:solidFill>
+              <a:srgbClr val="002060"/>
+            </a:solidFill>
+            <a:prstDash val="solid"/>
+            <a:round/>
+            <a:headEnd type="none" w="med" len="med"/>
+            <a:tailEnd type="none" w="med" len="med"/>
+          </a:ln>
+          <a:effectLst/>
+        </p:spPr>
+        <p:txBody>
+          <a:bodyPr vert="horz" wrap="square" lIns="91440" tIns="45720" rIns="91440" bIns="45720" numCol="1" rtlCol="0" anchor="b" anchorCtr="0" compatLnSpc="1">
+            <a:prstTxWarp prst="textNoShape">
+              <a:avLst/>
+            </a:prstTxWarp>
+          </a:bodyPr>
+          <a:lstStyle/>
+          <a:p>
+            <a:pPr marL="0" marR="0" indent="0" algn="ctr" defTabSz="914400" rtl="0" eaLnBrk="0" fontAlgn="base" latinLnBrk="0" hangingPunct="0">
+              <a:lnSpc>
+                <a:spcPct val="100000"/>
+              </a:lnSpc>
+              <a:spcBef>
+                <a:spcPct val="0"/>
+              </a:spcBef>
+              <a:spcAft>
+                <a:spcPct val="0"/>
+              </a:spcAft>
+              <a:buClrTx/>
+              <a:buSzTx/>
+              <a:buFontTx/>
+              <a:buNone/>
+              <a:tabLst/>
+            </a:pPr>
+            <a:endParaRPr kumimoji="0" lang="en-US" sz="1100" b="1" i="0" u="none" strike="noStrike" cap="none" normalizeH="0" baseline="0" dirty="0" smtClean="0">
+              <a:ln>
+                <a:noFill/>
+              </a:ln>
+              <a:solidFill>
+                <a:srgbClr val="FF0000"/>
+              </a:solidFill>
+              <a:effectLst/>
+              <a:latin typeface="Arial" charset="0"/>
+            </a:endParaRPr>
+          </a:p>
+        </p:txBody>
+      </p:sp>
+      <p:sp>
+        <p:nvSpPr>
+          <p:cNvPr id="3" name="TextBox 2"/>
+          <p:cNvSpPr txBox="1"/>
+          <p:nvPr/>
+        </p:nvSpPr>
+        <p:spPr>
+          <a:xfrm>
+            <a:off x="3287424" y="2488854"/>
+            <a:ext cx="3009900" cy="1569660"/>
+          </a:xfrm>
+          <a:prstGeom prst="rect">
+            <a:avLst/>
+          </a:prstGeom>
+          <a:noFill/>
+        </p:spPr>
+        <p:txBody>
+          <a:bodyPr wrap="square" rtlCol="0">
+            <a:spAutoFit/>
+          </a:bodyPr>
+          <a:lstStyle/>
+          <a:p>
+            <a:r>
+              <a:rPr lang="en-US" dirty="0" smtClean="0"/>
+              <a:t>Need to do the Hello World template so it generates the platform header files!</a:t>
+            </a:r>
+            <a:endParaRPr lang="en-US" dirty="0"/>
+          </a:p>
+        </p:txBody>
+      </p:sp>
     </p:spTree>
     <p:extLst>
       <p:ext uri="{BB962C8B-B14F-4D97-AF65-F5344CB8AC3E}">
-        <p14:creationId xmlns:p14="http://schemas.microsoft.com/office/powerpoint/2010/main" val="3343449583"/>
+        <p14:creationId xmlns:p14="http://schemas.microsoft.com/office/powerpoint/2010/main" val="1294665769"/>
       </p:ext>
     </p:extLst>
   </p:cSld>
@@ -28403,9 +29570,80 @@
   <p:timing>
     <p:tnLst>
       <p:par>
-        <p:cTn id="1" dur="indefinite" restart="never" nodeType="tmRoot"/>
+        <p:cTn id="1" dur="indefinite" restart="never" nodeType="tmRoot">
+          <p:childTnLst>
+            <p:seq concurrent="1" nextAc="seek">
+              <p:cTn id="2" dur="indefinite" nodeType="mainSeq">
+                <p:childTnLst>
+                  <p:par>
+                    <p:cTn id="3" fill="hold">
+                      <p:stCondLst>
+                        <p:cond delay="indefinite"/>
+                      </p:stCondLst>
+                      <p:childTnLst>
+                        <p:par>
+                          <p:cTn id="4" fill="hold">
+                            <p:stCondLst>
+                              <p:cond delay="0"/>
+                            </p:stCondLst>
+                            <p:childTnLst>
+                              <p:par>
+                                <p:cTn id="5" presetID="1" presetClass="entr" presetSubtype="0" fill="hold" grpId="0" nodeType="clickEffect">
+                                  <p:stCondLst>
+                                    <p:cond delay="0"/>
+                                  </p:stCondLst>
+                                  <p:childTnLst>
+                                    <p:set>
+                                      <p:cBhvr>
+                                        <p:cTn id="6" dur="1" fill="hold">
+                                          <p:stCondLst>
+                                            <p:cond delay="0"/>
+                                          </p:stCondLst>
+                                        </p:cTn>
+                                        <p:tgtEl>
+                                          <p:spTgt spid="8"/>
+                                        </p:tgtEl>
+                                        <p:attrNameLst>
+                                          <p:attrName>style.visibility</p:attrName>
+                                        </p:attrNameLst>
+                                      </p:cBhvr>
+                                      <p:to>
+                                        <p:strVal val="visible"/>
+                                      </p:to>
+                                    </p:set>
+                                  </p:childTnLst>
+                                </p:cTn>
+                              </p:par>
+                            </p:childTnLst>
+                          </p:cTn>
+                        </p:par>
+                      </p:childTnLst>
+                    </p:cTn>
+                  </p:par>
+                </p:childTnLst>
+              </p:cTn>
+              <p:prevCondLst>
+                <p:cond evt="onPrev" delay="0">
+                  <p:tgtEl>
+                    <p:sldTgt/>
+                  </p:tgtEl>
+                </p:cond>
+              </p:prevCondLst>
+              <p:nextCondLst>
+                <p:cond evt="onNext" delay="0">
+                  <p:tgtEl>
+                    <p:sldTgt/>
+                  </p:tgtEl>
+                </p:cond>
+              </p:nextCondLst>
+            </p:seq>
+          </p:childTnLst>
+        </p:cTn>
       </p:par>
     </p:tnLst>
+    <p:bldLst>
+      <p:bldP spid="8" grpId="0" animBg="1"/>
+    </p:bldLst>
   </p:timing>
 </p:sld>
 </file>
@@ -28476,13 +29714,13 @@
       </p:sp>
       <p:pic>
         <p:nvPicPr>
-          <p:cNvPr id="9218" name="Picture 2"/>
+          <p:cNvPr id="8194" name="Picture 2"/>
           <p:cNvPicPr>
             <a:picLocks noChangeAspect="1" noChangeArrowheads="1"/>
           </p:cNvPicPr>
           <p:nvPr/>
         </p:nvPicPr>
-        <p:blipFill>
+        <p:blipFill rotWithShape="1">
           <a:blip r:embed="rId2">
             <a:extLst>
               <a:ext uri="{28A0092B-C50C-407E-A947-70E740481C1C}">
@@ -28490,15 +29728,13 @@
               </a:ext>
             </a:extLst>
           </a:blip>
-          <a:srcRect/>
-          <a:stretch>
-            <a:fillRect/>
-          </a:stretch>
+          <a:srcRect r="55134" b="59850"/>
+          <a:stretch/>
         </p:blipFill>
         <p:spPr bwMode="auto">
           <a:xfrm>
-            <a:off x="1519060" y="1453488"/>
-            <a:ext cx="6105881" cy="4911994"/>
+            <a:off x="286603" y="1460943"/>
+            <a:ext cx="8597470" cy="4325708"/>
           </a:xfrm>
           <a:prstGeom prst="rect">
             <a:avLst/>
@@ -28573,7 +29809,7 @@
     </p:spTree>
     <p:extLst>
       <p:ext uri="{BB962C8B-B14F-4D97-AF65-F5344CB8AC3E}">
-        <p14:creationId xmlns:p14="http://schemas.microsoft.com/office/powerpoint/2010/main" val="1372889096"/>
+        <p14:creationId xmlns:p14="http://schemas.microsoft.com/office/powerpoint/2010/main" val="3343449583"/>
       </p:ext>
     </p:extLst>
   </p:cSld>
@@ -28624,7 +29860,7 @@
           <a:p>
             <a:r>
               <a:rPr lang="en-US" dirty="0" smtClean="0"/>
-              <a:t>Lec18.c</a:t>
+              <a:t>New C Source File</a:t>
             </a:r>
             <a:endParaRPr lang="en-US" dirty="0"/>
           </a:p>
@@ -28656,7 +29892,7 @@
       </p:sp>
       <p:pic>
         <p:nvPicPr>
-          <p:cNvPr id="11266" name="Picture 2"/>
+          <p:cNvPr id="9218" name="Picture 2"/>
           <p:cNvPicPr>
             <a:picLocks noChangeAspect="1" noChangeArrowheads="1"/>
           </p:cNvPicPr>
@@ -28677,8 +29913,8 @@
         </p:blipFill>
         <p:spPr bwMode="auto">
           <a:xfrm>
-            <a:off x="742521" y="1462352"/>
-            <a:ext cx="7541670" cy="6473823"/>
+            <a:off x="1519060" y="1453488"/>
+            <a:ext cx="6105881" cy="4911994"/>
           </a:xfrm>
           <a:prstGeom prst="rect">
             <a:avLst/>
@@ -28753,7 +29989,7 @@
     </p:spTree>
     <p:extLst>
       <p:ext uri="{BB962C8B-B14F-4D97-AF65-F5344CB8AC3E}">
-        <p14:creationId xmlns:p14="http://schemas.microsoft.com/office/powerpoint/2010/main" val="4152855559"/>
+        <p14:creationId xmlns:p14="http://schemas.microsoft.com/office/powerpoint/2010/main" val="1372889096"/>
       </p:ext>
     </p:extLst>
   </p:cSld>
@@ -28836,7 +30072,7 @@
       </p:sp>
       <p:pic>
         <p:nvPicPr>
-          <p:cNvPr id="12290" name="Picture 2"/>
+          <p:cNvPr id="11266" name="Picture 2"/>
           <p:cNvPicPr>
             <a:picLocks noChangeAspect="1" noChangeArrowheads="1"/>
           </p:cNvPicPr>
@@ -28857,8 +30093,8 @@
         </p:blipFill>
         <p:spPr bwMode="auto">
           <a:xfrm>
-            <a:off x="682299" y="1463524"/>
-            <a:ext cx="7779403" cy="5394476"/>
+            <a:off x="742521" y="1462352"/>
+            <a:ext cx="7541670" cy="6473823"/>
           </a:xfrm>
           <a:prstGeom prst="rect">
             <a:avLst/>
@@ -28933,7 +30169,7 @@
     </p:spTree>
     <p:extLst>
       <p:ext uri="{BB962C8B-B14F-4D97-AF65-F5344CB8AC3E}">
-        <p14:creationId xmlns:p14="http://schemas.microsoft.com/office/powerpoint/2010/main" val="2394188725"/>
+        <p14:creationId xmlns:p14="http://schemas.microsoft.com/office/powerpoint/2010/main" val="4152855559"/>
       </p:ext>
     </p:extLst>
   </p:cSld>
@@ -29194,7 +30430,7 @@
       </p:sp>
       <p:pic>
         <p:nvPicPr>
-          <p:cNvPr id="13314" name="Picture 2"/>
+          <p:cNvPr id="12290" name="Picture 2"/>
           <p:cNvPicPr>
             <a:picLocks noChangeAspect="1" noChangeArrowheads="1"/>
           </p:cNvPicPr>
@@ -29215,8 +30451,8 @@
         </p:blipFill>
         <p:spPr bwMode="auto">
           <a:xfrm>
-            <a:off x="863861" y="1460382"/>
-            <a:ext cx="7416279" cy="5400743"/>
+            <a:off x="682299" y="1463524"/>
+            <a:ext cx="7779403" cy="5394476"/>
           </a:xfrm>
           <a:prstGeom prst="rect">
             <a:avLst/>
@@ -29291,7 +30527,7 @@
     </p:spTree>
     <p:extLst>
       <p:ext uri="{BB962C8B-B14F-4D97-AF65-F5344CB8AC3E}">
-        <p14:creationId xmlns:p14="http://schemas.microsoft.com/office/powerpoint/2010/main" val="1491760549"/>
+        <p14:creationId xmlns:p14="http://schemas.microsoft.com/office/powerpoint/2010/main" val="2394188725"/>
       </p:ext>
     </p:extLst>
   </p:cSld>
@@ -29374,7 +30610,7 @@
       </p:sp>
       <p:pic>
         <p:nvPicPr>
-          <p:cNvPr id="14338" name="Picture 2"/>
+          <p:cNvPr id="13314" name="Picture 2"/>
           <p:cNvPicPr>
             <a:picLocks noChangeAspect="1" noChangeArrowheads="1"/>
           </p:cNvPicPr>
@@ -29395,8 +30631,8 @@
         </p:blipFill>
         <p:spPr bwMode="auto">
           <a:xfrm>
-            <a:off x="833296" y="1457681"/>
-            <a:ext cx="7477409" cy="4955368"/>
+            <a:off x="863861" y="1460382"/>
+            <a:ext cx="7416279" cy="5400743"/>
           </a:xfrm>
           <a:prstGeom prst="rect">
             <a:avLst/>
@@ -29471,7 +30707,7 @@
     </p:spTree>
     <p:extLst>
       <p:ext uri="{BB962C8B-B14F-4D97-AF65-F5344CB8AC3E}">
-        <p14:creationId xmlns:p14="http://schemas.microsoft.com/office/powerpoint/2010/main" val="1548462666"/>
+        <p14:creationId xmlns:p14="http://schemas.microsoft.com/office/powerpoint/2010/main" val="1491760549"/>
       </p:ext>
     </p:extLst>
   </p:cSld>
@@ -29554,7 +30790,7 @@
       </p:sp>
       <p:pic>
         <p:nvPicPr>
-          <p:cNvPr id="15362" name="Picture 2"/>
+          <p:cNvPr id="14338" name="Picture 2"/>
           <p:cNvPicPr>
             <a:picLocks noChangeAspect="1" noChangeArrowheads="1"/>
           </p:cNvPicPr>
@@ -29575,8 +30811,8 @@
         </p:blipFill>
         <p:spPr bwMode="auto">
           <a:xfrm>
-            <a:off x="442193" y="1454767"/>
-            <a:ext cx="8306012" cy="4907574"/>
+            <a:off x="833296" y="1457681"/>
+            <a:ext cx="7477409" cy="4955368"/>
           </a:xfrm>
           <a:prstGeom prst="rect">
             <a:avLst/>
@@ -29651,7 +30887,7 @@
     </p:spTree>
     <p:extLst>
       <p:ext uri="{BB962C8B-B14F-4D97-AF65-F5344CB8AC3E}">
-        <p14:creationId xmlns:p14="http://schemas.microsoft.com/office/powerpoint/2010/main" val="1297048171"/>
+        <p14:creationId xmlns:p14="http://schemas.microsoft.com/office/powerpoint/2010/main" val="1548462666"/>
       </p:ext>
     </p:extLst>
   </p:cSld>
@@ -29734,7 +30970,7 @@
       </p:sp>
       <p:pic>
         <p:nvPicPr>
-          <p:cNvPr id="17410" name="Picture 2"/>
+          <p:cNvPr id="15362" name="Picture 2"/>
           <p:cNvPicPr>
             <a:picLocks noChangeAspect="1" noChangeArrowheads="1"/>
           </p:cNvPicPr>
@@ -29755,8 +30991,8 @@
         </p:blipFill>
         <p:spPr bwMode="auto">
           <a:xfrm>
-            <a:off x="516052" y="1465001"/>
-            <a:ext cx="8211407" cy="4485422"/>
+            <a:off x="442193" y="1454767"/>
+            <a:ext cx="8306012" cy="4907574"/>
           </a:xfrm>
           <a:prstGeom prst="rect">
             <a:avLst/>
@@ -29831,7 +31067,7 @@
     </p:spTree>
     <p:extLst>
       <p:ext uri="{BB962C8B-B14F-4D97-AF65-F5344CB8AC3E}">
-        <p14:creationId xmlns:p14="http://schemas.microsoft.com/office/powerpoint/2010/main" val="3816301874"/>
+        <p14:creationId xmlns:p14="http://schemas.microsoft.com/office/powerpoint/2010/main" val="1297048171"/>
       </p:ext>
     </p:extLst>
   </p:cSld>
@@ -29881,17 +31117,10 @@
           <a:lstStyle/>
           <a:p>
             <a:r>
-              <a:rPr lang="en-US" dirty="0"/>
-              <a:t>Part 2: Software Questions</a:t>
-            </a:r>
-            <a:r>
               <a:rPr lang="en-US" dirty="0" smtClean="0"/>
-              <a:t>/ Notes </a:t>
-            </a:r>
-            <a:r>
-              <a:rPr lang="en-US" dirty="0"/>
-              <a:t>related to handout</a:t>
-            </a:r>
+              <a:t>Lec18.c</a:t>
+            </a:r>
+            <a:endParaRPr lang="en-US" dirty="0"/>
           </a:p>
         </p:txBody>
       </p:sp>
@@ -29915,109 +31144,64 @@
           <a:bodyPr/>
           <a:lstStyle/>
           <a:p>
-            <a:r>
-              <a:rPr lang="en-US" sz="2200" b="0" dirty="0"/>
-              <a:t>Why doesn't the 'c' command cause the counter to count up by 1?</a:t>
-            </a:r>
-          </a:p>
-          <a:p>
-            <a:r>
-              <a:rPr lang="en-US" sz="2200" b="0" dirty="0"/>
-              <a:t>On line </a:t>
-            </a:r>
-            <a:r>
-              <a:rPr lang="en-US" sz="2200" b="0" dirty="0" smtClean="0"/>
-              <a:t>130, </a:t>
-            </a:r>
-            <a:r>
-              <a:rPr lang="en-US" sz="2200" b="0" dirty="0"/>
-              <a:t>why did I subtract 0x30?</a:t>
-            </a:r>
-          </a:p>
-          <a:p>
-            <a:r>
-              <a:rPr lang="en-US" sz="2200" b="0" dirty="0"/>
-              <a:t>After loading the counter on line </a:t>
-            </a:r>
-            <a:r>
-              <a:rPr lang="en-US" sz="2200" b="0" dirty="0" smtClean="0"/>
-              <a:t>132, </a:t>
-            </a:r>
-            <a:r>
-              <a:rPr lang="en-US" sz="2200" b="0" dirty="0"/>
-              <a:t>something should be done that is missing.</a:t>
-            </a:r>
-          </a:p>
-          <a:p>
-            <a:r>
-              <a:rPr lang="en-US" sz="2200" b="0" dirty="0"/>
-              <a:t>What line of VHDL code in </a:t>
-            </a:r>
-            <a:r>
-              <a:rPr lang="en-US" sz="2000" b="0" dirty="0"/>
-              <a:t>my_counter_ip_v1_0_S00_AXI.vhd </a:t>
-            </a:r>
-            <a:r>
-              <a:rPr lang="en-US" sz="2200" b="0" dirty="0"/>
-              <a:t>is "activated" when line </a:t>
-            </a:r>
-            <a:r>
-              <a:rPr lang="en-US" sz="2200" b="0" dirty="0" smtClean="0"/>
-              <a:t>80 </a:t>
-            </a:r>
-            <a:r>
-              <a:rPr lang="en-US" sz="2200" b="0" dirty="0"/>
-              <a:t>executes?</a:t>
-            </a:r>
-          </a:p>
-          <a:p>
-            <a:r>
-              <a:rPr lang="en-US" sz="2200" b="0" dirty="0"/>
-              <a:t>What line of VHDL code in </a:t>
-            </a:r>
-            <a:r>
-              <a:rPr lang="en-US" sz="2000" b="0" dirty="0"/>
-              <a:t>my_counter_ip_v1_0_S00_AXI.vhd </a:t>
-            </a:r>
-            <a:r>
-              <a:rPr lang="en-US" sz="2200" b="0" dirty="0"/>
-              <a:t>is "activated" when line </a:t>
-            </a:r>
-            <a:r>
-              <a:rPr lang="en-US" sz="2200" b="0" dirty="0" smtClean="0"/>
-              <a:t>141 </a:t>
-            </a:r>
-            <a:r>
-              <a:rPr lang="en-US" sz="2200" b="0" dirty="0"/>
-              <a:t>executes?</a:t>
-            </a:r>
-          </a:p>
-          <a:p>
-            <a:r>
-              <a:rPr lang="en-US" sz="2200" b="0" dirty="0"/>
-              <a:t>What line of VHDL code in lec18.vhdl "activated" when </a:t>
-            </a:r>
-            <a:r>
-              <a:rPr lang="en-US" sz="2200" b="0"/>
-              <a:t>line </a:t>
-            </a:r>
-            <a:r>
-              <a:rPr lang="en-US" sz="2200" b="0" smtClean="0"/>
-              <a:t>141 </a:t>
-            </a:r>
-            <a:r>
-              <a:rPr lang="en-US" sz="2200" b="0" dirty="0"/>
-              <a:t>executes?</a:t>
-            </a:r>
-          </a:p>
-          <a:p>
-            <a:r>
-              <a:rPr lang="en-US" sz="2200" b="0" dirty="0"/>
-              <a:t>What appears to be the naming convention for hardware registers?</a:t>
-            </a:r>
-          </a:p>
-        </p:txBody>
-      </p:sp>
+            <a:endParaRPr lang="en-US" b="0" dirty="0"/>
+          </a:p>
+        </p:txBody>
+      </p:sp>
+      <p:pic>
+        <p:nvPicPr>
+          <p:cNvPr id="17410" name="Picture 2"/>
+          <p:cNvPicPr>
+            <a:picLocks noChangeAspect="1" noChangeArrowheads="1"/>
+          </p:cNvPicPr>
+          <p:nvPr/>
+        </p:nvPicPr>
+        <p:blipFill>
+          <a:blip r:embed="rId2">
+            <a:extLst>
+              <a:ext uri="{28A0092B-C50C-407E-A947-70E740481C1C}">
+                <a14:useLocalDpi xmlns:a14="http://schemas.microsoft.com/office/drawing/2010/main" val="0"/>
+              </a:ext>
+            </a:extLst>
+          </a:blip>
+          <a:srcRect/>
+          <a:stretch>
+            <a:fillRect/>
+          </a:stretch>
+        </p:blipFill>
+        <p:spPr bwMode="auto">
+          <a:xfrm>
+            <a:off x="516052" y="1465001"/>
+            <a:ext cx="8211407" cy="4485422"/>
+          </a:xfrm>
+          <a:prstGeom prst="rect">
+            <a:avLst/>
+          </a:prstGeom>
+          <a:noFill/>
+          <a:ln>
+            <a:noFill/>
+          </a:ln>
+          <a:extLst>
+            <a:ext uri="{909E8E84-426E-40DD-AFC4-6F175D3DCCD1}">
+              <a14:hiddenFill xmlns:a14="http://schemas.microsoft.com/office/drawing/2010/main">
+                <a:solidFill>
+                  <a:schemeClr val="accent1"/>
+                </a:solidFill>
+              </a14:hiddenFill>
+            </a:ext>
+            <a:ext uri="{91240B29-F687-4F45-9708-019B960494DF}">
+              <a14:hiddenLine xmlns:a14="http://schemas.microsoft.com/office/drawing/2010/main" w="9525">
+                <a:solidFill>
+                  <a:schemeClr val="tx1"/>
+                </a:solidFill>
+                <a:miter lim="800000"/>
+                <a:headEnd/>
+                <a:tailEnd/>
+              </a14:hiddenLine>
+            </a:ext>
+          </a:extLst>
+        </p:spPr>
+      </p:pic>
       <p:sp>
         <p:nvSpPr>
           <p:cNvPr id="6" name="Slide Number Placeholder 3"/>
@@ -30051,6 +31235,238 @@
                 <a:defRPr/>
               </a:pPr>
               <a:t>64</a:t>
+            </a:fld>
+            <a:endParaRPr lang="en-US" dirty="0">
+              <a:solidFill>
+                <a:srgbClr val="000000"/>
+              </a:solidFill>
+            </a:endParaRPr>
+          </a:p>
+        </p:txBody>
+      </p:sp>
+    </p:spTree>
+    <p:extLst>
+      <p:ext uri="{BB962C8B-B14F-4D97-AF65-F5344CB8AC3E}">
+        <p14:creationId xmlns:p14="http://schemas.microsoft.com/office/powerpoint/2010/main" val="3816301874"/>
+      </p:ext>
+    </p:extLst>
+  </p:cSld>
+  <p:clrMapOvr>
+    <a:masterClrMapping/>
+  </p:clrMapOvr>
+  <p:timing>
+    <p:tnLst>
+      <p:par>
+        <p:cTn id="1" dur="indefinite" restart="never" nodeType="tmRoot"/>
+      </p:par>
+    </p:tnLst>
+  </p:timing>
+</p:sld>
+</file>
+
+<file path=ppt/slides/slide65.xml><?xml version="1.0" encoding="utf-8"?>
+<p:sld xmlns:a="http://schemas.openxmlformats.org/drawingml/2006/main" xmlns:r="http://schemas.openxmlformats.org/officeDocument/2006/relationships" xmlns:p="http://schemas.openxmlformats.org/presentationml/2006/main">
+  <p:cSld>
+    <p:spTree>
+      <p:nvGrpSpPr>
+        <p:cNvPr id="1" name=""/>
+        <p:cNvGrpSpPr/>
+        <p:nvPr/>
+      </p:nvGrpSpPr>
+      <p:grpSpPr>
+        <a:xfrm>
+          <a:off x="0" y="0"/>
+          <a:ext cx="0" cy="0"/>
+          <a:chOff x="0" y="0"/>
+          <a:chExt cx="0" cy="0"/>
+        </a:xfrm>
+      </p:grpSpPr>
+      <p:sp>
+        <p:nvSpPr>
+          <p:cNvPr id="2" name="Title 1"/>
+          <p:cNvSpPr>
+            <a:spLocks noGrp="1"/>
+          </p:cNvSpPr>
+          <p:nvPr>
+            <p:ph type="title"/>
+          </p:nvPr>
+        </p:nvSpPr>
+        <p:spPr/>
+        <p:txBody>
+          <a:bodyPr/>
+          <a:lstStyle/>
+          <a:p>
+            <a:r>
+              <a:rPr lang="en-US" dirty="0"/>
+              <a:t>Part 2: Software Questions</a:t>
+            </a:r>
+            <a:r>
+              <a:rPr lang="en-US" dirty="0" smtClean="0"/>
+              <a:t>/ Notes </a:t>
+            </a:r>
+            <a:r>
+              <a:rPr lang="en-US" dirty="0"/>
+              <a:t>related to handout</a:t>
+            </a:r>
+          </a:p>
+        </p:txBody>
+      </p:sp>
+      <p:sp>
+        <p:nvSpPr>
+          <p:cNvPr id="4" name="Content Placeholder 3"/>
+          <p:cNvSpPr>
+            <a:spLocks noGrp="1"/>
+          </p:cNvSpPr>
+          <p:nvPr>
+            <p:ph idx="1"/>
+          </p:nvPr>
+        </p:nvSpPr>
+        <p:spPr>
+          <a:xfrm>
+            <a:off x="581736" y="1523052"/>
+            <a:ext cx="8131175" cy="4324350"/>
+          </a:xfrm>
+        </p:spPr>
+        <p:txBody>
+          <a:bodyPr/>
+          <a:lstStyle/>
+          <a:p>
+            <a:r>
+              <a:rPr lang="en-US" sz="2200" b="0" dirty="0"/>
+              <a:t>Why doesn't the 'c' command cause the counter to count up by 1?</a:t>
+            </a:r>
+          </a:p>
+          <a:p>
+            <a:r>
+              <a:rPr lang="en-US" sz="2200" b="0" dirty="0"/>
+              <a:t>On line </a:t>
+            </a:r>
+            <a:r>
+              <a:rPr lang="en-US" sz="2200" b="0" dirty="0" smtClean="0"/>
+              <a:t>130, </a:t>
+            </a:r>
+            <a:r>
+              <a:rPr lang="en-US" sz="2200" b="0" dirty="0"/>
+              <a:t>why did I subtract 0x30?</a:t>
+            </a:r>
+          </a:p>
+          <a:p>
+            <a:r>
+              <a:rPr lang="en-US" sz="2200" b="0" dirty="0"/>
+              <a:t>After loading the counter on line </a:t>
+            </a:r>
+            <a:r>
+              <a:rPr lang="en-US" sz="2200" b="0" dirty="0" smtClean="0"/>
+              <a:t>132, </a:t>
+            </a:r>
+            <a:r>
+              <a:rPr lang="en-US" sz="2200" b="0" dirty="0"/>
+              <a:t>something should be done that is missing.</a:t>
+            </a:r>
+          </a:p>
+          <a:p>
+            <a:r>
+              <a:rPr lang="en-US" sz="2200" b="0" dirty="0"/>
+              <a:t>What line of VHDL code in </a:t>
+            </a:r>
+            <a:r>
+              <a:rPr lang="en-US" sz="2000" b="0" dirty="0"/>
+              <a:t>my_counter_ip_v1_0_S00_AXI.vhd </a:t>
+            </a:r>
+            <a:r>
+              <a:rPr lang="en-US" sz="2200" b="0" dirty="0"/>
+              <a:t>is "activated" when line </a:t>
+            </a:r>
+            <a:r>
+              <a:rPr lang="en-US" sz="2200" b="0" dirty="0" smtClean="0"/>
+              <a:t>80 </a:t>
+            </a:r>
+            <a:r>
+              <a:rPr lang="en-US" sz="2200" b="0" dirty="0"/>
+              <a:t>executes?</a:t>
+            </a:r>
+          </a:p>
+          <a:p>
+            <a:r>
+              <a:rPr lang="en-US" sz="2200" b="0" dirty="0"/>
+              <a:t>What line of VHDL code in </a:t>
+            </a:r>
+            <a:r>
+              <a:rPr lang="en-US" sz="2000" b="0" dirty="0"/>
+              <a:t>my_counter_ip_v1_0_S00_AXI.vhd </a:t>
+            </a:r>
+            <a:r>
+              <a:rPr lang="en-US" sz="2200" b="0" dirty="0"/>
+              <a:t>is "activated" when line </a:t>
+            </a:r>
+            <a:r>
+              <a:rPr lang="en-US" sz="2200" b="0" dirty="0" smtClean="0"/>
+              <a:t>141 </a:t>
+            </a:r>
+            <a:r>
+              <a:rPr lang="en-US" sz="2200" b="0" dirty="0"/>
+              <a:t>executes?</a:t>
+            </a:r>
+          </a:p>
+          <a:p>
+            <a:r>
+              <a:rPr lang="en-US" sz="2200" b="0" dirty="0"/>
+              <a:t>What line of VHDL code in lec18.vhdl "activated" when </a:t>
+            </a:r>
+            <a:r>
+              <a:rPr lang="en-US" sz="2200" b="0"/>
+              <a:t>line </a:t>
+            </a:r>
+            <a:r>
+              <a:rPr lang="en-US" sz="2200" b="0" smtClean="0"/>
+              <a:t>141 </a:t>
+            </a:r>
+            <a:r>
+              <a:rPr lang="en-US" sz="2200" b="0" dirty="0"/>
+              <a:t>executes?</a:t>
+            </a:r>
+          </a:p>
+          <a:p>
+            <a:r>
+              <a:rPr lang="en-US" sz="2200" b="0" dirty="0"/>
+              <a:t>What appears to be the naming convention for hardware registers?</a:t>
+            </a:r>
+          </a:p>
+        </p:txBody>
+      </p:sp>
+      <p:sp>
+        <p:nvSpPr>
+          <p:cNvPr id="6" name="Slide Number Placeholder 3"/>
+          <p:cNvSpPr>
+            <a:spLocks noGrp="1"/>
+          </p:cNvSpPr>
+          <p:nvPr>
+            <p:ph type="sldNum" sz="quarter" idx="10"/>
+          </p:nvPr>
+        </p:nvSpPr>
+        <p:spPr>
+          <a:xfrm>
+            <a:off x="6910388" y="6381750"/>
+            <a:ext cx="2133600" cy="476250"/>
+          </a:xfrm>
+        </p:spPr>
+        <p:txBody>
+          <a:bodyPr/>
+          <a:lstStyle/>
+          <a:p>
+            <a:pPr>
+              <a:defRPr/>
+            </a:pPr>
+            <a:fld id="{62D6D4B2-7611-498F-8780-1EDC26277454}" type="slidenum">
+              <a:rPr lang="en-US" smtClean="0">
+                <a:solidFill>
+                  <a:srgbClr val="000000"/>
+                </a:solidFill>
+              </a:rPr>
+              <a:pPr>
+                <a:defRPr/>
+              </a:pPr>
+              <a:t>65</a:t>
             </a:fld>
             <a:endParaRPr lang="en-US" dirty="0">
               <a:solidFill>
@@ -30397,7 +31813,7 @@
 </p:sld>
 </file>
 
-<file path=ppt/slides/slide65.xml><?xml version="1.0" encoding="utf-8"?>
+<file path=ppt/slides/slide66.xml><?xml version="1.0" encoding="utf-8"?>
 <p:sld xmlns:a="http://schemas.openxmlformats.org/drawingml/2006/main" xmlns:r="http://schemas.openxmlformats.org/officeDocument/2006/relationships" xmlns:p="http://schemas.openxmlformats.org/presentationml/2006/main">
   <p:cSld>
     <p:spTree>
@@ -30505,7 +31921,7 @@
               <a:pPr>
                 <a:defRPr/>
               </a:pPr>
-              <a:t>65</a:t>
+              <a:t>66</a:t>
             </a:fld>
             <a:endParaRPr lang="en-US" dirty="0">
               <a:solidFill>
@@ -30535,7 +31951,7 @@
 </p:sld>
 </file>
 
-<file path=ppt/slides/slide66.xml><?xml version="1.0" encoding="utf-8"?>
+<file path=ppt/slides/slide67.xml><?xml version="1.0" encoding="utf-8"?>
 <p:sld xmlns:a="http://schemas.openxmlformats.org/drawingml/2006/main" xmlns:r="http://schemas.openxmlformats.org/officeDocument/2006/relationships" xmlns:p="http://schemas.openxmlformats.org/presentationml/2006/main">
   <p:cSld>
     <p:spTree>
@@ -31777,7 +33193,7 @@
               <a:pPr>
                 <a:defRPr/>
               </a:pPr>
-              <a:t>66</a:t>
+              <a:t>67</a:t>
             </a:fld>
             <a:endParaRPr lang="en-US" dirty="0">
               <a:solidFill>
@@ -31875,7 +33291,7 @@
 </p:sld>
 </file>
 
-<file path=ppt/slides/slide67.xml><?xml version="1.0" encoding="utf-8"?>
+<file path=ppt/slides/slide68.xml><?xml version="1.0" encoding="utf-8"?>
 <p:sld xmlns:a="http://schemas.openxmlformats.org/drawingml/2006/main" xmlns:r="http://schemas.openxmlformats.org/officeDocument/2006/relationships" xmlns:p="http://schemas.openxmlformats.org/presentationml/2006/main">
   <p:cSld>
     <p:spTree>
@@ -31975,7 +33391,7 @@
               <a:pPr>
                 <a:defRPr/>
               </a:pPr>
-              <a:t>67</a:t>
+              <a:t>68</a:t>
             </a:fld>
             <a:endParaRPr lang="en-US" dirty="0">
               <a:solidFill>
@@ -32528,7 +33944,7 @@
 </p:sld>
 </file>
 
-<file path=ppt/slides/slide68.xml><?xml version="1.0" encoding="utf-8"?>
+<file path=ppt/slides/slide69.xml><?xml version="1.0" encoding="utf-8"?>
 <p:sld xmlns:a="http://schemas.openxmlformats.org/drawingml/2006/main" xmlns:r="http://schemas.openxmlformats.org/officeDocument/2006/relationships" xmlns:p="http://schemas.openxmlformats.org/presentationml/2006/main">
   <p:cSld>
     <p:spTree>
@@ -32624,7 +34040,7 @@
               <a:pPr>
                 <a:defRPr/>
               </a:pPr>
-              <a:t>68</a:t>
+              <a:t>69</a:t>
             </a:fld>
             <a:endParaRPr lang="en-US" dirty="0">
               <a:solidFill>
@@ -32692,175 +34108,6 @@
     <p:extLst>
       <p:ext uri="{BB962C8B-B14F-4D97-AF65-F5344CB8AC3E}">
         <p14:creationId xmlns:p14="http://schemas.microsoft.com/office/powerpoint/2010/main" val="1217759264"/>
-      </p:ext>
-    </p:extLst>
-  </p:cSld>
-  <p:clrMapOvr>
-    <a:masterClrMapping/>
-  </p:clrMapOvr>
-  <p:timing>
-    <p:tnLst>
-      <p:par>
-        <p:cTn id="1" dur="indefinite" restart="never" nodeType="tmRoot"/>
-      </p:par>
-    </p:tnLst>
-  </p:timing>
-</p:sld>
-</file>
-
-<file path=ppt/slides/slide69.xml><?xml version="1.0" encoding="utf-8"?>
-<p:sld xmlns:a="http://schemas.openxmlformats.org/drawingml/2006/main" xmlns:r="http://schemas.openxmlformats.org/officeDocument/2006/relationships" xmlns:p="http://schemas.openxmlformats.org/presentationml/2006/main">
-  <p:cSld>
-    <p:spTree>
-      <p:nvGrpSpPr>
-        <p:cNvPr id="1" name=""/>
-        <p:cNvGrpSpPr/>
-        <p:nvPr/>
-      </p:nvGrpSpPr>
-      <p:grpSpPr>
-        <a:xfrm>
-          <a:off x="0" y="0"/>
-          <a:ext cx="0" cy="0"/>
-          <a:chOff x="0" y="0"/>
-          <a:chExt cx="0" cy="0"/>
-        </a:xfrm>
-      </p:grpSpPr>
-      <p:sp>
-        <p:nvSpPr>
-          <p:cNvPr id="2" name="Title 1"/>
-          <p:cNvSpPr>
-            <a:spLocks noGrp="1"/>
-          </p:cNvSpPr>
-          <p:nvPr>
-            <p:ph type="title"/>
-          </p:nvPr>
-        </p:nvSpPr>
-        <p:spPr/>
-        <p:txBody>
-          <a:bodyPr/>
-          <a:lstStyle/>
-          <a:p>
-            <a:r>
-              <a:rPr lang="en-US" dirty="0" err="1"/>
-              <a:t>MicroBlaze</a:t>
-            </a:r>
-            <a:r>
-              <a:rPr lang="en-US" dirty="0"/>
-              <a:t> + Custom IP</a:t>
-            </a:r>
-          </a:p>
-        </p:txBody>
-      </p:sp>
-      <p:sp>
-        <p:nvSpPr>
-          <p:cNvPr id="4" name="Content Placeholder 3"/>
-          <p:cNvSpPr>
-            <a:spLocks noGrp="1"/>
-          </p:cNvSpPr>
-          <p:nvPr>
-            <p:ph idx="1"/>
-          </p:nvPr>
-        </p:nvSpPr>
-        <p:spPr>
-          <a:xfrm>
-            <a:off x="581736" y="1523052"/>
-            <a:ext cx="8131175" cy="4324350"/>
-          </a:xfrm>
-        </p:spPr>
-        <p:txBody>
-          <a:bodyPr/>
-          <a:lstStyle/>
-          <a:p>
-            <a:endParaRPr lang="en-US" b="0" dirty="0"/>
-          </a:p>
-        </p:txBody>
-      </p:sp>
-      <p:pic>
-        <p:nvPicPr>
-          <p:cNvPr id="6" name="Picture 5"/>
-          <p:cNvPicPr>
-            <a:picLocks noChangeAspect="1" noChangeArrowheads="1"/>
-          </p:cNvPicPr>
-          <p:nvPr/>
-        </p:nvPicPr>
-        <p:blipFill>
-          <a:blip r:embed="rId2">
-            <a:extLst>
-              <a:ext uri="{28A0092B-C50C-407E-A947-70E740481C1C}">
-                <a14:useLocalDpi xmlns:a14="http://schemas.microsoft.com/office/drawing/2010/main" val="0"/>
-              </a:ext>
-            </a:extLst>
-          </a:blip>
-          <a:stretch>
-            <a:fillRect/>
-          </a:stretch>
-        </p:blipFill>
-        <p:spPr bwMode="auto">
-          <a:xfrm>
-            <a:off x="54590" y="1473958"/>
-            <a:ext cx="9045195" cy="4890505"/>
-          </a:xfrm>
-          <a:prstGeom prst="rect">
-            <a:avLst/>
-          </a:prstGeom>
-          <a:noFill/>
-          <a:extLst>
-            <a:ext uri="{909E8E84-426E-40DD-AFC4-6F175D3DCCD1}">
-              <a14:hiddenFill xmlns:a14="http://schemas.microsoft.com/office/drawing/2010/main">
-                <a:solidFill>
-                  <a:srgbClr val="FFFFFF"/>
-                </a:solidFill>
-              </a14:hiddenFill>
-            </a:ext>
-          </a:extLst>
-        </p:spPr>
-      </p:pic>
-      <p:sp>
-        <p:nvSpPr>
-          <p:cNvPr id="7" name="Slide Number Placeholder 3"/>
-          <p:cNvSpPr>
-            <a:spLocks noGrp="1"/>
-          </p:cNvSpPr>
-          <p:nvPr>
-            <p:ph type="sldNum" sz="quarter" idx="10"/>
-          </p:nvPr>
-        </p:nvSpPr>
-        <p:spPr>
-          <a:xfrm>
-            <a:off x="6910388" y="6381750"/>
-            <a:ext cx="2133600" cy="476250"/>
-          </a:xfrm>
-        </p:spPr>
-        <p:txBody>
-          <a:bodyPr/>
-          <a:lstStyle/>
-          <a:p>
-            <a:pPr>
-              <a:defRPr/>
-            </a:pPr>
-            <a:fld id="{62D6D4B2-7611-498F-8780-1EDC26277454}" type="slidenum">
-              <a:rPr lang="en-US" smtClean="0">
-                <a:solidFill>
-                  <a:srgbClr val="000000"/>
-                </a:solidFill>
-              </a:rPr>
-              <a:pPr>
-                <a:defRPr/>
-              </a:pPr>
-              <a:t>69</a:t>
-            </a:fld>
-            <a:endParaRPr lang="en-US" dirty="0">
-              <a:solidFill>
-                <a:srgbClr val="000000"/>
-              </a:solidFill>
-            </a:endParaRPr>
-          </a:p>
-        </p:txBody>
-      </p:sp>
-    </p:spTree>
-    <p:extLst>
-      <p:ext uri="{BB962C8B-B14F-4D97-AF65-F5344CB8AC3E}">
-        <p14:creationId xmlns:p14="http://schemas.microsoft.com/office/powerpoint/2010/main" val="1345783736"/>
       </p:ext>
     </p:extLst>
   </p:cSld>
@@ -33095,6 +34342,175 @@
     <p:extLst>
       <p:ext uri="{BB962C8B-B14F-4D97-AF65-F5344CB8AC3E}">
         <p14:creationId xmlns:p14="http://schemas.microsoft.com/office/powerpoint/2010/main" val="2776391871"/>
+      </p:ext>
+    </p:extLst>
+  </p:cSld>
+  <p:clrMapOvr>
+    <a:masterClrMapping/>
+  </p:clrMapOvr>
+  <p:timing>
+    <p:tnLst>
+      <p:par>
+        <p:cTn id="1" dur="indefinite" restart="never" nodeType="tmRoot"/>
+      </p:par>
+    </p:tnLst>
+  </p:timing>
+</p:sld>
+</file>
+
+<file path=ppt/slides/slide70.xml><?xml version="1.0" encoding="utf-8"?>
+<p:sld xmlns:a="http://schemas.openxmlformats.org/drawingml/2006/main" xmlns:r="http://schemas.openxmlformats.org/officeDocument/2006/relationships" xmlns:p="http://schemas.openxmlformats.org/presentationml/2006/main">
+  <p:cSld>
+    <p:spTree>
+      <p:nvGrpSpPr>
+        <p:cNvPr id="1" name=""/>
+        <p:cNvGrpSpPr/>
+        <p:nvPr/>
+      </p:nvGrpSpPr>
+      <p:grpSpPr>
+        <a:xfrm>
+          <a:off x="0" y="0"/>
+          <a:ext cx="0" cy="0"/>
+          <a:chOff x="0" y="0"/>
+          <a:chExt cx="0" cy="0"/>
+        </a:xfrm>
+      </p:grpSpPr>
+      <p:sp>
+        <p:nvSpPr>
+          <p:cNvPr id="2" name="Title 1"/>
+          <p:cNvSpPr>
+            <a:spLocks noGrp="1"/>
+          </p:cNvSpPr>
+          <p:nvPr>
+            <p:ph type="title"/>
+          </p:nvPr>
+        </p:nvSpPr>
+        <p:spPr/>
+        <p:txBody>
+          <a:bodyPr/>
+          <a:lstStyle/>
+          <a:p>
+            <a:r>
+              <a:rPr lang="en-US" dirty="0" err="1"/>
+              <a:t>MicroBlaze</a:t>
+            </a:r>
+            <a:r>
+              <a:rPr lang="en-US" dirty="0"/>
+              <a:t> + Custom IP</a:t>
+            </a:r>
+          </a:p>
+        </p:txBody>
+      </p:sp>
+      <p:sp>
+        <p:nvSpPr>
+          <p:cNvPr id="4" name="Content Placeholder 3"/>
+          <p:cNvSpPr>
+            <a:spLocks noGrp="1"/>
+          </p:cNvSpPr>
+          <p:nvPr>
+            <p:ph idx="1"/>
+          </p:nvPr>
+        </p:nvSpPr>
+        <p:spPr>
+          <a:xfrm>
+            <a:off x="581736" y="1523052"/>
+            <a:ext cx="8131175" cy="4324350"/>
+          </a:xfrm>
+        </p:spPr>
+        <p:txBody>
+          <a:bodyPr/>
+          <a:lstStyle/>
+          <a:p>
+            <a:endParaRPr lang="en-US" b="0" dirty="0"/>
+          </a:p>
+        </p:txBody>
+      </p:sp>
+      <p:pic>
+        <p:nvPicPr>
+          <p:cNvPr id="6" name="Picture 5"/>
+          <p:cNvPicPr>
+            <a:picLocks noChangeAspect="1" noChangeArrowheads="1"/>
+          </p:cNvPicPr>
+          <p:nvPr/>
+        </p:nvPicPr>
+        <p:blipFill>
+          <a:blip r:embed="rId2">
+            <a:extLst>
+              <a:ext uri="{28A0092B-C50C-407E-A947-70E740481C1C}">
+                <a14:useLocalDpi xmlns:a14="http://schemas.microsoft.com/office/drawing/2010/main" val="0"/>
+              </a:ext>
+            </a:extLst>
+          </a:blip>
+          <a:stretch>
+            <a:fillRect/>
+          </a:stretch>
+        </p:blipFill>
+        <p:spPr bwMode="auto">
+          <a:xfrm>
+            <a:off x="54590" y="1473958"/>
+            <a:ext cx="9045195" cy="4890505"/>
+          </a:xfrm>
+          <a:prstGeom prst="rect">
+            <a:avLst/>
+          </a:prstGeom>
+          <a:noFill/>
+          <a:extLst>
+            <a:ext uri="{909E8E84-426E-40DD-AFC4-6F175D3DCCD1}">
+              <a14:hiddenFill xmlns:a14="http://schemas.microsoft.com/office/drawing/2010/main">
+                <a:solidFill>
+                  <a:srgbClr val="FFFFFF"/>
+                </a:solidFill>
+              </a14:hiddenFill>
+            </a:ext>
+          </a:extLst>
+        </p:spPr>
+      </p:pic>
+      <p:sp>
+        <p:nvSpPr>
+          <p:cNvPr id="7" name="Slide Number Placeholder 3"/>
+          <p:cNvSpPr>
+            <a:spLocks noGrp="1"/>
+          </p:cNvSpPr>
+          <p:nvPr>
+            <p:ph type="sldNum" sz="quarter" idx="10"/>
+          </p:nvPr>
+        </p:nvSpPr>
+        <p:spPr>
+          <a:xfrm>
+            <a:off x="6910388" y="6381750"/>
+            <a:ext cx="2133600" cy="476250"/>
+          </a:xfrm>
+        </p:spPr>
+        <p:txBody>
+          <a:bodyPr/>
+          <a:lstStyle/>
+          <a:p>
+            <a:pPr>
+              <a:defRPr/>
+            </a:pPr>
+            <a:fld id="{62D6D4B2-7611-498F-8780-1EDC26277454}" type="slidenum">
+              <a:rPr lang="en-US" smtClean="0">
+                <a:solidFill>
+                  <a:srgbClr val="000000"/>
+                </a:solidFill>
+              </a:rPr>
+              <a:pPr>
+                <a:defRPr/>
+              </a:pPr>
+              <a:t>70</a:t>
+            </a:fld>
+            <a:endParaRPr lang="en-US" dirty="0">
+              <a:solidFill>
+                <a:srgbClr val="000000"/>
+              </a:solidFill>
+            </a:endParaRPr>
+          </a:p>
+        </p:txBody>
+      </p:sp>
+    </p:spTree>
+    <p:extLst>
+      <p:ext uri="{BB962C8B-B14F-4D97-AF65-F5344CB8AC3E}">
+        <p14:creationId xmlns:p14="http://schemas.microsoft.com/office/powerpoint/2010/main" val="1345783736"/>
       </p:ext>
     </p:extLst>
   </p:cSld>

</xml_diff>